<commit_message>
Fixed preview screen and updated powerpoint
</commit_message>
<xml_diff>
--- a/Software Engineering.pptx
+++ b/Software Engineering.pptx
@@ -35,18 +35,21 @@
     <p:sldId id="280" r:id="rId31"/>
     <p:sldId id="281" r:id="rId32"/>
     <p:sldId id="282" r:id="rId33"/>
+    <p:sldId id="283" r:id="rId34"/>
+    <p:sldId id="284" r:id="rId35"/>
+    <p:sldId id="285" r:id="rId36"/>
   </p:sldIdLst>
   <p:sldSz cy="5143500" cx="9144000"/>
   <p:notesSz cx="6858000" cy="9144000"/>
   <p:embeddedFontLst>
     <p:embeddedFont>
       <p:font typeface="Average"/>
-      <p:regular r:id="rId34"/>
+      <p:regular r:id="rId37"/>
     </p:embeddedFont>
     <p:embeddedFont>
       <p:font typeface="Oswald"/>
-      <p:regular r:id="rId35"/>
-      <p:bold r:id="rId36"/>
+      <p:regular r:id="rId38"/>
+      <p:bold r:id="rId39"/>
     </p:embeddedFont>
   </p:embeddedFontLst>
   <p:defaultTextStyle>
@@ -564,7 +567,7 @@
   <p:cSld>
     <p:spTree>
       <p:nvGrpSpPr>
-        <p:cNvPr id="115" name="Shape 115"/>
+        <p:cNvPr id="114" name="Shape 114"/>
         <p:cNvGrpSpPr/>
         <p:nvPr/>
       </p:nvGrpSpPr>
@@ -578,7 +581,7 @@
       </p:grpSpPr>
       <p:sp>
         <p:nvSpPr>
-          <p:cNvPr id="116" name="Shape 116"/>
+          <p:cNvPr id="115" name="Shape 115"/>
           <p:cNvSpPr/>
           <p:nvPr>
             <p:ph idx="2" type="sldImg"/>
@@ -622,7 +625,7 @@
       </p:sp>
       <p:sp>
         <p:nvSpPr>
-          <p:cNvPr id="117" name="Shape 117"/>
+          <p:cNvPr id="116" name="Shape 116"/>
           <p:cNvSpPr txBox="1"/>
           <p:nvPr>
             <p:ph idx="1" type="body"/>
@@ -669,7 +672,7 @@
   <p:cSld>
     <p:spTree>
       <p:nvGrpSpPr>
-        <p:cNvPr id="121" name="Shape 121"/>
+        <p:cNvPr id="120" name="Shape 120"/>
         <p:cNvGrpSpPr/>
         <p:nvPr/>
       </p:nvGrpSpPr>
@@ -683,7 +686,7 @@
       </p:grpSpPr>
       <p:sp>
         <p:nvSpPr>
-          <p:cNvPr id="122" name="Shape 122"/>
+          <p:cNvPr id="121" name="Shape 121"/>
           <p:cNvSpPr/>
           <p:nvPr>
             <p:ph idx="2" type="sldImg"/>
@@ -727,7 +730,7 @@
       </p:sp>
       <p:sp>
         <p:nvSpPr>
-          <p:cNvPr id="123" name="Shape 123"/>
+          <p:cNvPr id="122" name="Shape 122"/>
           <p:cNvSpPr txBox="1"/>
           <p:nvPr>
             <p:ph idx="1" type="body"/>
@@ -774,7 +777,7 @@
   <p:cSld>
     <p:spTree>
       <p:nvGrpSpPr>
-        <p:cNvPr id="126" name="Shape 126"/>
+        <p:cNvPr id="125" name="Shape 125"/>
         <p:cNvGrpSpPr/>
         <p:nvPr/>
       </p:nvGrpSpPr>
@@ -788,7 +791,7 @@
       </p:grpSpPr>
       <p:sp>
         <p:nvSpPr>
-          <p:cNvPr id="127" name="Shape 127"/>
+          <p:cNvPr id="126" name="Shape 126"/>
           <p:cNvSpPr/>
           <p:nvPr>
             <p:ph idx="2" type="sldImg"/>
@@ -832,7 +835,7 @@
       </p:sp>
       <p:sp>
         <p:nvSpPr>
-          <p:cNvPr id="128" name="Shape 128"/>
+          <p:cNvPr id="127" name="Shape 127"/>
           <p:cNvSpPr txBox="1"/>
           <p:nvPr>
             <p:ph idx="1" type="body"/>
@@ -879,7 +882,7 @@
   <p:cSld>
     <p:spTree>
       <p:nvGrpSpPr>
-        <p:cNvPr id="134" name="Shape 134"/>
+        <p:cNvPr id="131" name="Shape 131"/>
         <p:cNvGrpSpPr/>
         <p:nvPr/>
       </p:nvGrpSpPr>
@@ -893,7 +896,7 @@
       </p:grpSpPr>
       <p:sp>
         <p:nvSpPr>
-          <p:cNvPr id="135" name="Shape 135"/>
+          <p:cNvPr id="132" name="Shape 132"/>
           <p:cNvSpPr/>
           <p:nvPr>
             <p:ph idx="2" type="sldImg"/>
@@ -937,7 +940,7 @@
       </p:sp>
       <p:sp>
         <p:nvSpPr>
-          <p:cNvPr id="136" name="Shape 136"/>
+          <p:cNvPr id="133" name="Shape 133"/>
           <p:cNvSpPr txBox="1"/>
           <p:nvPr>
             <p:ph idx="1" type="body"/>
@@ -958,7 +961,7 @@
           </a:bodyPr>
           <a:lstStyle/>
           <a:p>
-            <a:pPr lvl="0" rtl="0">
+            <a:pPr>
               <a:spcBef>
                 <a:spcPts val="0"/>
               </a:spcBef>
@@ -984,7 +987,7 @@
   <p:cSld>
     <p:spTree>
       <p:nvGrpSpPr>
-        <p:cNvPr id="141" name="Shape 141"/>
+        <p:cNvPr id="137" name="Shape 137"/>
         <p:cNvGrpSpPr/>
         <p:nvPr/>
       </p:nvGrpSpPr>
@@ -998,7 +1001,7 @@
       </p:grpSpPr>
       <p:sp>
         <p:nvSpPr>
-          <p:cNvPr id="142" name="Shape 142"/>
+          <p:cNvPr id="138" name="Shape 138"/>
           <p:cNvSpPr/>
           <p:nvPr>
             <p:ph idx="2" type="sldImg"/>
@@ -1042,7 +1045,7 @@
       </p:sp>
       <p:sp>
         <p:nvSpPr>
-          <p:cNvPr id="143" name="Shape 143"/>
+          <p:cNvPr id="139" name="Shape 139"/>
           <p:cNvSpPr txBox="1"/>
           <p:nvPr>
             <p:ph idx="1" type="body"/>
@@ -1089,7 +1092,7 @@
   <p:cSld>
     <p:spTree>
       <p:nvGrpSpPr>
-        <p:cNvPr id="148" name="Shape 148"/>
+        <p:cNvPr id="142" name="Shape 142"/>
         <p:cNvGrpSpPr/>
         <p:nvPr/>
       </p:nvGrpSpPr>
@@ -1103,7 +1106,7 @@
       </p:grpSpPr>
       <p:sp>
         <p:nvSpPr>
-          <p:cNvPr id="149" name="Shape 149"/>
+          <p:cNvPr id="143" name="Shape 143"/>
           <p:cNvSpPr/>
           <p:nvPr>
             <p:ph idx="2" type="sldImg"/>
@@ -1147,7 +1150,7 @@
       </p:sp>
       <p:sp>
         <p:nvSpPr>
-          <p:cNvPr id="150" name="Shape 150"/>
+          <p:cNvPr id="144" name="Shape 144"/>
           <p:cNvSpPr txBox="1"/>
           <p:nvPr>
             <p:ph idx="1" type="body"/>
@@ -1194,7 +1197,7 @@
   <p:cSld>
     <p:spTree>
       <p:nvGrpSpPr>
-        <p:cNvPr id="155" name="Shape 155"/>
+        <p:cNvPr id="150" name="Shape 150"/>
         <p:cNvGrpSpPr/>
         <p:nvPr/>
       </p:nvGrpSpPr>
@@ -1208,7 +1211,7 @@
       </p:grpSpPr>
       <p:sp>
         <p:nvSpPr>
-          <p:cNvPr id="156" name="Shape 156"/>
+          <p:cNvPr id="151" name="Shape 151"/>
           <p:cNvSpPr/>
           <p:nvPr>
             <p:ph idx="2" type="sldImg"/>
@@ -1252,7 +1255,7 @@
       </p:sp>
       <p:sp>
         <p:nvSpPr>
-          <p:cNvPr id="157" name="Shape 157"/>
+          <p:cNvPr id="152" name="Shape 152"/>
           <p:cNvSpPr txBox="1"/>
           <p:nvPr>
             <p:ph idx="1" type="body"/>
@@ -1273,7 +1276,7 @@
           </a:bodyPr>
           <a:lstStyle/>
           <a:p>
-            <a:pPr>
+            <a:pPr lvl="0" rtl="0">
               <a:spcBef>
                 <a:spcPts val="0"/>
               </a:spcBef>
@@ -1299,7 +1302,7 @@
   <p:cSld>
     <p:spTree>
       <p:nvGrpSpPr>
-        <p:cNvPr id="162" name="Shape 162"/>
+        <p:cNvPr id="157" name="Shape 157"/>
         <p:cNvGrpSpPr/>
         <p:nvPr/>
       </p:nvGrpSpPr>
@@ -1313,7 +1316,7 @@
       </p:grpSpPr>
       <p:sp>
         <p:nvSpPr>
-          <p:cNvPr id="163" name="Shape 163"/>
+          <p:cNvPr id="158" name="Shape 158"/>
           <p:cNvSpPr/>
           <p:nvPr>
             <p:ph idx="2" type="sldImg"/>
@@ -1357,7 +1360,7 @@
       </p:sp>
       <p:sp>
         <p:nvSpPr>
-          <p:cNvPr id="164" name="Shape 164"/>
+          <p:cNvPr id="159" name="Shape 159"/>
           <p:cNvSpPr txBox="1"/>
           <p:nvPr>
             <p:ph idx="1" type="body"/>
@@ -1404,7 +1407,7 @@
   <p:cSld>
     <p:spTree>
       <p:nvGrpSpPr>
-        <p:cNvPr id="167" name="Shape 167"/>
+        <p:cNvPr id="164" name="Shape 164"/>
         <p:cNvGrpSpPr/>
         <p:nvPr/>
       </p:nvGrpSpPr>
@@ -1418,7 +1421,7 @@
       </p:grpSpPr>
       <p:sp>
         <p:nvSpPr>
-          <p:cNvPr id="168" name="Shape 168"/>
+          <p:cNvPr id="165" name="Shape 165"/>
           <p:cNvSpPr/>
           <p:nvPr>
             <p:ph idx="2" type="sldImg"/>
@@ -1462,7 +1465,7 @@
       </p:sp>
       <p:sp>
         <p:nvSpPr>
-          <p:cNvPr id="169" name="Shape 169"/>
+          <p:cNvPr id="166" name="Shape 166"/>
           <p:cNvSpPr txBox="1"/>
           <p:nvPr>
             <p:ph idx="1" type="body"/>
@@ -1509,7 +1512,7 @@
   <p:cSld>
     <p:spTree>
       <p:nvGrpSpPr>
-        <p:cNvPr id="174" name="Shape 174"/>
+        <p:cNvPr id="171" name="Shape 171"/>
         <p:cNvGrpSpPr/>
         <p:nvPr/>
       </p:nvGrpSpPr>
@@ -1523,7 +1526,7 @@
       </p:grpSpPr>
       <p:sp>
         <p:nvSpPr>
-          <p:cNvPr id="175" name="Shape 175"/>
+          <p:cNvPr id="172" name="Shape 172"/>
           <p:cNvSpPr/>
           <p:nvPr>
             <p:ph idx="2" type="sldImg"/>
@@ -1567,7 +1570,7 @@
       </p:sp>
       <p:sp>
         <p:nvSpPr>
-          <p:cNvPr id="176" name="Shape 176"/>
+          <p:cNvPr id="173" name="Shape 173"/>
           <p:cNvSpPr txBox="1"/>
           <p:nvPr>
             <p:ph idx="1" type="body"/>
@@ -1719,7 +1722,7 @@
   <p:cSld>
     <p:spTree>
       <p:nvGrpSpPr>
-        <p:cNvPr id="181" name="Shape 181"/>
+        <p:cNvPr id="178" name="Shape 178"/>
         <p:cNvGrpSpPr/>
         <p:nvPr/>
       </p:nvGrpSpPr>
@@ -1733,7 +1736,7 @@
       </p:grpSpPr>
       <p:sp>
         <p:nvSpPr>
-          <p:cNvPr id="182" name="Shape 182"/>
+          <p:cNvPr id="179" name="Shape 179"/>
           <p:cNvSpPr/>
           <p:nvPr>
             <p:ph idx="2" type="sldImg"/>
@@ -1777,7 +1780,7 @@
       </p:sp>
       <p:sp>
         <p:nvSpPr>
-          <p:cNvPr id="183" name="Shape 183"/>
+          <p:cNvPr id="180" name="Shape 180"/>
           <p:cNvSpPr txBox="1"/>
           <p:nvPr>
             <p:ph idx="1" type="body"/>
@@ -1824,7 +1827,7 @@
   <p:cSld>
     <p:spTree>
       <p:nvGrpSpPr>
-        <p:cNvPr id="188" name="Shape 188"/>
+        <p:cNvPr id="183" name="Shape 183"/>
         <p:cNvGrpSpPr/>
         <p:nvPr/>
       </p:nvGrpSpPr>
@@ -1838,7 +1841,7 @@
       </p:grpSpPr>
       <p:sp>
         <p:nvSpPr>
-          <p:cNvPr id="189" name="Shape 189"/>
+          <p:cNvPr id="184" name="Shape 184"/>
           <p:cNvSpPr/>
           <p:nvPr>
             <p:ph idx="2" type="sldImg"/>
@@ -1882,7 +1885,7 @@
       </p:sp>
       <p:sp>
         <p:nvSpPr>
-          <p:cNvPr id="190" name="Shape 190"/>
+          <p:cNvPr id="185" name="Shape 185"/>
           <p:cNvSpPr txBox="1"/>
           <p:nvPr>
             <p:ph idx="1" type="body"/>
@@ -1929,7 +1932,7 @@
   <p:cSld>
     <p:spTree>
       <p:nvGrpSpPr>
-        <p:cNvPr id="195" name="Shape 195"/>
+        <p:cNvPr id="190" name="Shape 190"/>
         <p:cNvGrpSpPr/>
         <p:nvPr/>
       </p:nvGrpSpPr>
@@ -1943,7 +1946,7 @@
       </p:grpSpPr>
       <p:sp>
         <p:nvSpPr>
-          <p:cNvPr id="196" name="Shape 196"/>
+          <p:cNvPr id="191" name="Shape 191"/>
           <p:cNvSpPr/>
           <p:nvPr>
             <p:ph idx="2" type="sldImg"/>
@@ -1987,7 +1990,7 @@
       </p:sp>
       <p:sp>
         <p:nvSpPr>
-          <p:cNvPr id="197" name="Shape 197"/>
+          <p:cNvPr id="192" name="Shape 192"/>
           <p:cNvSpPr txBox="1"/>
           <p:nvPr>
             <p:ph idx="1" type="body"/>
@@ -2034,7 +2037,7 @@
   <p:cSld>
     <p:spTree>
       <p:nvGrpSpPr>
-        <p:cNvPr id="200" name="Shape 200"/>
+        <p:cNvPr id="197" name="Shape 197"/>
         <p:cNvGrpSpPr/>
         <p:nvPr/>
       </p:nvGrpSpPr>
@@ -2048,7 +2051,7 @@
       </p:grpSpPr>
       <p:sp>
         <p:nvSpPr>
-          <p:cNvPr id="201" name="Shape 201"/>
+          <p:cNvPr id="198" name="Shape 198"/>
           <p:cNvSpPr/>
           <p:nvPr>
             <p:ph idx="2" type="sldImg"/>
@@ -2092,7 +2095,7 @@
       </p:sp>
       <p:sp>
         <p:nvSpPr>
-          <p:cNvPr id="202" name="Shape 202"/>
+          <p:cNvPr id="199" name="Shape 199"/>
           <p:cNvSpPr txBox="1"/>
           <p:nvPr>
             <p:ph idx="1" type="body"/>
@@ -2139,7 +2142,7 @@
   <p:cSld>
     <p:spTree>
       <p:nvGrpSpPr>
-        <p:cNvPr id="206" name="Shape 206"/>
+        <p:cNvPr id="204" name="Shape 204"/>
         <p:cNvGrpSpPr/>
         <p:nvPr/>
       </p:nvGrpSpPr>
@@ -2153,7 +2156,7 @@
       </p:grpSpPr>
       <p:sp>
         <p:nvSpPr>
-          <p:cNvPr id="207" name="Shape 207"/>
+          <p:cNvPr id="205" name="Shape 205"/>
           <p:cNvSpPr/>
           <p:nvPr>
             <p:ph idx="2" type="sldImg"/>
@@ -2197,7 +2200,7 @@
       </p:sp>
       <p:sp>
         <p:nvSpPr>
-          <p:cNvPr id="208" name="Shape 208"/>
+          <p:cNvPr id="206" name="Shape 206"/>
           <p:cNvSpPr txBox="1"/>
           <p:nvPr>
             <p:ph idx="1" type="body"/>
@@ -2349,7 +2352,7 @@
   <p:cSld>
     <p:spTree>
       <p:nvGrpSpPr>
-        <p:cNvPr id="217" name="Shape 217"/>
+        <p:cNvPr id="216" name="Shape 216"/>
         <p:cNvGrpSpPr/>
         <p:nvPr/>
       </p:nvGrpSpPr>
@@ -2363,7 +2366,7 @@
       </p:grpSpPr>
       <p:sp>
         <p:nvSpPr>
-          <p:cNvPr id="218" name="Shape 218"/>
+          <p:cNvPr id="217" name="Shape 217"/>
           <p:cNvSpPr/>
           <p:nvPr>
             <p:ph idx="2" type="sldImg"/>
@@ -2407,7 +2410,7 @@
       </p:sp>
       <p:sp>
         <p:nvSpPr>
-          <p:cNvPr id="219" name="Shape 219"/>
+          <p:cNvPr id="218" name="Shape 218"/>
           <p:cNvSpPr txBox="1"/>
           <p:nvPr>
             <p:ph idx="1" type="body"/>
@@ -2454,7 +2457,7 @@
   <p:cSld>
     <p:spTree>
       <p:nvGrpSpPr>
-        <p:cNvPr id="223" name="Shape 223"/>
+        <p:cNvPr id="222" name="Shape 222"/>
         <p:cNvGrpSpPr/>
         <p:nvPr/>
       </p:nvGrpSpPr>
@@ -2468,7 +2471,7 @@
       </p:grpSpPr>
       <p:sp>
         <p:nvSpPr>
-          <p:cNvPr id="224" name="Shape 224"/>
+          <p:cNvPr id="223" name="Shape 223"/>
           <p:cNvSpPr/>
           <p:nvPr>
             <p:ph idx="2" type="sldImg"/>
@@ -2512,7 +2515,7 @@
       </p:sp>
       <p:sp>
         <p:nvSpPr>
-          <p:cNvPr id="225" name="Shape 225"/>
+          <p:cNvPr id="224" name="Shape 224"/>
           <p:cNvSpPr txBox="1"/>
           <p:nvPr>
             <p:ph idx="1" type="body"/>
@@ -2554,12 +2557,12 @@
 </p:notes>
 </file>
 
-<file path=ppt/notesSlides/notesSlide3.xml><?xml version="1.0" encoding="utf-8"?>
+<file path=ppt/notesSlides/notesSlide28.xml><?xml version="1.0" encoding="utf-8"?>
 <p:notes xmlns:a="http://schemas.openxmlformats.org/drawingml/2006/main" xmlns:r="http://schemas.openxmlformats.org/officeDocument/2006/relationships" xmlns:mc="http://schemas.openxmlformats.org/markup-compatibility/2006" xmlns:mv="urn:schemas-microsoft-com:mac:vml" xmlns:p="http://schemas.openxmlformats.org/presentationml/2006/main" xmlns:c="http://schemas.openxmlformats.org/drawingml/2006/chart" xmlns:dgm="http://schemas.openxmlformats.org/drawingml/2006/diagram" xmlns:o="urn:schemas-microsoft-com:office:office" xmlns:v="urn:schemas-microsoft-com:vml" xmlns:pvml="urn:schemas-microsoft-com:office:powerpoint" xmlns:com="http://schemas.openxmlformats.org/drawingml/2006/compatibility" xmlns:p14="http://schemas.microsoft.com/office/powerpoint/2010/main" showMasterPhAnim="0" showMasterSp="0">
   <p:cSld>
     <p:spTree>
       <p:nvGrpSpPr>
-        <p:cNvPr id="73" name="Shape 73"/>
+        <p:cNvPr id="227" name="Shape 227"/>
         <p:cNvGrpSpPr/>
         <p:nvPr/>
       </p:nvGrpSpPr>
@@ -2573,7 +2576,7 @@
       </p:grpSpPr>
       <p:sp>
         <p:nvSpPr>
-          <p:cNvPr id="74" name="Shape 74"/>
+          <p:cNvPr id="228" name="Shape 228"/>
           <p:cNvSpPr/>
           <p:nvPr>
             <p:ph idx="2" type="sldImg"/>
@@ -2617,7 +2620,7 @@
       </p:sp>
       <p:sp>
         <p:nvSpPr>
-          <p:cNvPr id="75" name="Shape 75"/>
+          <p:cNvPr id="229" name="Shape 229"/>
           <p:cNvSpPr txBox="1"/>
           <p:nvPr>
             <p:ph idx="1" type="body"/>
@@ -2659,12 +2662,12 @@
 </p:notes>
 </file>
 
-<file path=ppt/notesSlides/notesSlide4.xml><?xml version="1.0" encoding="utf-8"?>
+<file path=ppt/notesSlides/notesSlide29.xml><?xml version="1.0" encoding="utf-8"?>
 <p:notes xmlns:a="http://schemas.openxmlformats.org/drawingml/2006/main" xmlns:r="http://schemas.openxmlformats.org/officeDocument/2006/relationships" xmlns:mc="http://schemas.openxmlformats.org/markup-compatibility/2006" xmlns:mv="urn:schemas-microsoft-com:mac:vml" xmlns:p="http://schemas.openxmlformats.org/presentationml/2006/main" xmlns:c="http://schemas.openxmlformats.org/drawingml/2006/chart" xmlns:dgm="http://schemas.openxmlformats.org/drawingml/2006/diagram" xmlns:o="urn:schemas-microsoft-com:office:office" xmlns:v="urn:schemas-microsoft-com:vml" xmlns:pvml="urn:schemas-microsoft-com:office:powerpoint" xmlns:com="http://schemas.openxmlformats.org/drawingml/2006/compatibility" xmlns:p14="http://schemas.microsoft.com/office/powerpoint/2010/main" showMasterPhAnim="0" showMasterSp="0">
   <p:cSld>
     <p:spTree>
       <p:nvGrpSpPr>
-        <p:cNvPr id="79" name="Shape 79"/>
+        <p:cNvPr id="233" name="Shape 233"/>
         <p:cNvGrpSpPr/>
         <p:nvPr/>
       </p:nvGrpSpPr>
@@ -2678,7 +2681,7 @@
       </p:grpSpPr>
       <p:sp>
         <p:nvSpPr>
-          <p:cNvPr id="80" name="Shape 80"/>
+          <p:cNvPr id="234" name="Shape 234"/>
           <p:cNvSpPr/>
           <p:nvPr>
             <p:ph idx="2" type="sldImg"/>
@@ -2722,7 +2725,7 @@
       </p:sp>
       <p:sp>
         <p:nvSpPr>
-          <p:cNvPr id="81" name="Shape 81"/>
+          <p:cNvPr id="235" name="Shape 235"/>
           <p:cNvSpPr txBox="1"/>
           <p:nvPr>
             <p:ph idx="1" type="body"/>
@@ -2764,12 +2767,12 @@
 </p:notes>
 </file>
 
-<file path=ppt/notesSlides/notesSlide5.xml><?xml version="1.0" encoding="utf-8"?>
+<file path=ppt/notesSlides/notesSlide3.xml><?xml version="1.0" encoding="utf-8"?>
 <p:notes xmlns:a="http://schemas.openxmlformats.org/drawingml/2006/main" xmlns:r="http://schemas.openxmlformats.org/officeDocument/2006/relationships" xmlns:mc="http://schemas.openxmlformats.org/markup-compatibility/2006" xmlns:mv="urn:schemas-microsoft-com:mac:vml" xmlns:p="http://schemas.openxmlformats.org/presentationml/2006/main" xmlns:c="http://schemas.openxmlformats.org/drawingml/2006/chart" xmlns:dgm="http://schemas.openxmlformats.org/drawingml/2006/diagram" xmlns:o="urn:schemas-microsoft-com:office:office" xmlns:v="urn:schemas-microsoft-com:vml" xmlns:pvml="urn:schemas-microsoft-com:office:powerpoint" xmlns:com="http://schemas.openxmlformats.org/drawingml/2006/compatibility" xmlns:p14="http://schemas.microsoft.com/office/powerpoint/2010/main" showMasterPhAnim="0" showMasterSp="0">
   <p:cSld>
     <p:spTree>
       <p:nvGrpSpPr>
-        <p:cNvPr id="85" name="Shape 85"/>
+        <p:cNvPr id="73" name="Shape 73"/>
         <p:cNvGrpSpPr/>
         <p:nvPr/>
       </p:nvGrpSpPr>
@@ -2783,7 +2786,7 @@
       </p:grpSpPr>
       <p:sp>
         <p:nvSpPr>
-          <p:cNvPr id="86" name="Shape 86"/>
+          <p:cNvPr id="74" name="Shape 74"/>
           <p:cNvSpPr/>
           <p:nvPr>
             <p:ph idx="2" type="sldImg"/>
@@ -2827,7 +2830,7 @@
       </p:sp>
       <p:sp>
         <p:nvSpPr>
-          <p:cNvPr id="87" name="Shape 87"/>
+          <p:cNvPr id="75" name="Shape 75"/>
           <p:cNvSpPr txBox="1"/>
           <p:nvPr>
             <p:ph idx="1" type="body"/>
@@ -2869,12 +2872,12 @@
 </p:notes>
 </file>
 
-<file path=ppt/notesSlides/notesSlide6.xml><?xml version="1.0" encoding="utf-8"?>
+<file path=ppt/notesSlides/notesSlide30.xml><?xml version="1.0" encoding="utf-8"?>
 <p:notes xmlns:a="http://schemas.openxmlformats.org/drawingml/2006/main" xmlns:r="http://schemas.openxmlformats.org/officeDocument/2006/relationships" xmlns:mc="http://schemas.openxmlformats.org/markup-compatibility/2006" xmlns:mv="urn:schemas-microsoft-com:mac:vml" xmlns:p="http://schemas.openxmlformats.org/presentationml/2006/main" xmlns:c="http://schemas.openxmlformats.org/drawingml/2006/chart" xmlns:dgm="http://schemas.openxmlformats.org/drawingml/2006/diagram" xmlns:o="urn:schemas-microsoft-com:office:office" xmlns:v="urn:schemas-microsoft-com:vml" xmlns:pvml="urn:schemas-microsoft-com:office:powerpoint" xmlns:com="http://schemas.openxmlformats.org/drawingml/2006/compatibility" xmlns:p14="http://schemas.microsoft.com/office/powerpoint/2010/main" showMasterPhAnim="0" showMasterSp="0">
   <p:cSld>
     <p:spTree>
       <p:nvGrpSpPr>
-        <p:cNvPr id="91" name="Shape 91"/>
+        <p:cNvPr id="239" name="Shape 239"/>
         <p:cNvGrpSpPr/>
         <p:nvPr/>
       </p:nvGrpSpPr>
@@ -2888,7 +2891,7 @@
       </p:grpSpPr>
       <p:sp>
         <p:nvSpPr>
-          <p:cNvPr id="92" name="Shape 92"/>
+          <p:cNvPr id="240" name="Shape 240"/>
           <p:cNvSpPr/>
           <p:nvPr>
             <p:ph idx="2" type="sldImg"/>
@@ -2932,7 +2935,7 @@
       </p:sp>
       <p:sp>
         <p:nvSpPr>
-          <p:cNvPr id="93" name="Shape 93"/>
+          <p:cNvPr id="241" name="Shape 241"/>
           <p:cNvSpPr txBox="1"/>
           <p:nvPr>
             <p:ph idx="1" type="body"/>
@@ -2974,12 +2977,12 @@
 </p:notes>
 </file>
 
-<file path=ppt/notesSlides/notesSlide7.xml><?xml version="1.0" encoding="utf-8"?>
+<file path=ppt/notesSlides/notesSlide4.xml><?xml version="1.0" encoding="utf-8"?>
 <p:notes xmlns:a="http://schemas.openxmlformats.org/drawingml/2006/main" xmlns:r="http://schemas.openxmlformats.org/officeDocument/2006/relationships" xmlns:mc="http://schemas.openxmlformats.org/markup-compatibility/2006" xmlns:mv="urn:schemas-microsoft-com:mac:vml" xmlns:p="http://schemas.openxmlformats.org/presentationml/2006/main" xmlns:c="http://schemas.openxmlformats.org/drawingml/2006/chart" xmlns:dgm="http://schemas.openxmlformats.org/drawingml/2006/diagram" xmlns:o="urn:schemas-microsoft-com:office:office" xmlns:v="urn:schemas-microsoft-com:vml" xmlns:pvml="urn:schemas-microsoft-com:office:powerpoint" xmlns:com="http://schemas.openxmlformats.org/drawingml/2006/compatibility" xmlns:p14="http://schemas.microsoft.com/office/powerpoint/2010/main" showMasterPhAnim="0" showMasterSp="0">
   <p:cSld>
     <p:spTree>
       <p:nvGrpSpPr>
-        <p:cNvPr id="97" name="Shape 97"/>
+        <p:cNvPr id="79" name="Shape 79"/>
         <p:cNvGrpSpPr/>
         <p:nvPr/>
       </p:nvGrpSpPr>
@@ -2993,7 +2996,7 @@
       </p:grpSpPr>
       <p:sp>
         <p:nvSpPr>
-          <p:cNvPr id="98" name="Shape 98"/>
+          <p:cNvPr id="80" name="Shape 80"/>
           <p:cNvSpPr/>
           <p:nvPr>
             <p:ph idx="2" type="sldImg"/>
@@ -3037,7 +3040,7 @@
       </p:sp>
       <p:sp>
         <p:nvSpPr>
-          <p:cNvPr id="99" name="Shape 99"/>
+          <p:cNvPr id="81" name="Shape 81"/>
           <p:cNvSpPr txBox="1"/>
           <p:nvPr>
             <p:ph idx="1" type="body"/>
@@ -3079,12 +3082,12 @@
 </p:notes>
 </file>
 
-<file path=ppt/notesSlides/notesSlide8.xml><?xml version="1.0" encoding="utf-8"?>
+<file path=ppt/notesSlides/notesSlide5.xml><?xml version="1.0" encoding="utf-8"?>
 <p:notes xmlns:a="http://schemas.openxmlformats.org/drawingml/2006/main" xmlns:r="http://schemas.openxmlformats.org/officeDocument/2006/relationships" xmlns:mc="http://schemas.openxmlformats.org/markup-compatibility/2006" xmlns:mv="urn:schemas-microsoft-com:mac:vml" xmlns:p="http://schemas.openxmlformats.org/presentationml/2006/main" xmlns:c="http://schemas.openxmlformats.org/drawingml/2006/chart" xmlns:dgm="http://schemas.openxmlformats.org/drawingml/2006/diagram" xmlns:o="urn:schemas-microsoft-com:office:office" xmlns:v="urn:schemas-microsoft-com:vml" xmlns:pvml="urn:schemas-microsoft-com:office:powerpoint" xmlns:com="http://schemas.openxmlformats.org/drawingml/2006/compatibility" xmlns:p14="http://schemas.microsoft.com/office/powerpoint/2010/main" showMasterPhAnim="0" showMasterSp="0">
   <p:cSld>
     <p:spTree>
       <p:nvGrpSpPr>
-        <p:cNvPr id="103" name="Shape 103"/>
+        <p:cNvPr id="84" name="Shape 84"/>
         <p:cNvGrpSpPr/>
         <p:nvPr/>
       </p:nvGrpSpPr>
@@ -3098,7 +3101,7 @@
       </p:grpSpPr>
       <p:sp>
         <p:nvSpPr>
-          <p:cNvPr id="104" name="Shape 104"/>
+          <p:cNvPr id="85" name="Shape 85"/>
           <p:cNvSpPr/>
           <p:nvPr>
             <p:ph idx="2" type="sldImg"/>
@@ -3142,7 +3145,7 @@
       </p:sp>
       <p:sp>
         <p:nvSpPr>
-          <p:cNvPr id="105" name="Shape 105"/>
+          <p:cNvPr id="86" name="Shape 86"/>
           <p:cNvSpPr txBox="1"/>
           <p:nvPr>
             <p:ph idx="1" type="body"/>
@@ -3184,12 +3187,12 @@
 </p:notes>
 </file>
 
-<file path=ppt/notesSlides/notesSlide9.xml><?xml version="1.0" encoding="utf-8"?>
+<file path=ppt/notesSlides/notesSlide6.xml><?xml version="1.0" encoding="utf-8"?>
 <p:notes xmlns:a="http://schemas.openxmlformats.org/drawingml/2006/main" xmlns:r="http://schemas.openxmlformats.org/officeDocument/2006/relationships" xmlns:mc="http://schemas.openxmlformats.org/markup-compatibility/2006" xmlns:mv="urn:schemas-microsoft-com:mac:vml" xmlns:p="http://schemas.openxmlformats.org/presentationml/2006/main" xmlns:c="http://schemas.openxmlformats.org/drawingml/2006/chart" xmlns:dgm="http://schemas.openxmlformats.org/drawingml/2006/diagram" xmlns:o="urn:schemas-microsoft-com:office:office" xmlns:v="urn:schemas-microsoft-com:vml" xmlns:pvml="urn:schemas-microsoft-com:office:powerpoint" xmlns:com="http://schemas.openxmlformats.org/drawingml/2006/compatibility" xmlns:p14="http://schemas.microsoft.com/office/powerpoint/2010/main" showMasterPhAnim="0" showMasterSp="0">
   <p:cSld>
     <p:spTree>
       <p:nvGrpSpPr>
-        <p:cNvPr id="109" name="Shape 109"/>
+        <p:cNvPr id="90" name="Shape 90"/>
         <p:cNvGrpSpPr/>
         <p:nvPr/>
       </p:nvGrpSpPr>
@@ -3203,7 +3206,7 @@
       </p:grpSpPr>
       <p:sp>
         <p:nvSpPr>
-          <p:cNvPr id="110" name="Shape 110"/>
+          <p:cNvPr id="91" name="Shape 91"/>
           <p:cNvSpPr/>
           <p:nvPr>
             <p:ph idx="2" type="sldImg"/>
@@ -3247,7 +3250,322 @@
       </p:sp>
       <p:sp>
         <p:nvSpPr>
-          <p:cNvPr id="111" name="Shape 111"/>
+          <p:cNvPr id="92" name="Shape 92"/>
+          <p:cNvSpPr txBox="1"/>
+          <p:nvPr>
+            <p:ph idx="1" type="body"/>
+          </p:nvPr>
+        </p:nvSpPr>
+        <p:spPr>
+          <a:xfrm>
+            <a:off x="685800" y="4343400"/>
+            <a:ext cx="5486399" cy="4114800"/>
+          </a:xfrm>
+          <a:prstGeom prst="rect">
+            <a:avLst/>
+          </a:prstGeom>
+        </p:spPr>
+        <p:txBody>
+          <a:bodyPr anchorCtr="0" anchor="t" bIns="91425" lIns="91425" rIns="91425" tIns="91425">
+            <a:noAutofit/>
+          </a:bodyPr>
+          <a:lstStyle/>
+          <a:p>
+            <a:pPr>
+              <a:spcBef>
+                <a:spcPts val="0"/>
+              </a:spcBef>
+              <a:buNone/>
+            </a:pPr>
+            <a:r>
+              <a:t/>
+            </a:r>
+            <a:endParaRPr/>
+          </a:p>
+        </p:txBody>
+      </p:sp>
+    </p:spTree>
+  </p:cSld>
+  <p:clrMapOvr>
+    <a:masterClrMapping/>
+  </p:clrMapOvr>
+</p:notes>
+</file>
+
+<file path=ppt/notesSlides/notesSlide7.xml><?xml version="1.0" encoding="utf-8"?>
+<p:notes xmlns:a="http://schemas.openxmlformats.org/drawingml/2006/main" xmlns:r="http://schemas.openxmlformats.org/officeDocument/2006/relationships" xmlns:mc="http://schemas.openxmlformats.org/markup-compatibility/2006" xmlns:mv="urn:schemas-microsoft-com:mac:vml" xmlns:p="http://schemas.openxmlformats.org/presentationml/2006/main" xmlns:c="http://schemas.openxmlformats.org/drawingml/2006/chart" xmlns:dgm="http://schemas.openxmlformats.org/drawingml/2006/diagram" xmlns:o="urn:schemas-microsoft-com:office:office" xmlns:v="urn:schemas-microsoft-com:vml" xmlns:pvml="urn:schemas-microsoft-com:office:powerpoint" xmlns:com="http://schemas.openxmlformats.org/drawingml/2006/compatibility" xmlns:p14="http://schemas.microsoft.com/office/powerpoint/2010/main" showMasterPhAnim="0" showMasterSp="0">
+  <p:cSld>
+    <p:spTree>
+      <p:nvGrpSpPr>
+        <p:cNvPr id="96" name="Shape 96"/>
+        <p:cNvGrpSpPr/>
+        <p:nvPr/>
+      </p:nvGrpSpPr>
+      <p:grpSpPr>
+        <a:xfrm>
+          <a:off x="0" y="0"/>
+          <a:ext cx="0" cy="0"/>
+          <a:chOff x="0" y="0"/>
+          <a:chExt cx="0" cy="0"/>
+        </a:xfrm>
+      </p:grpSpPr>
+      <p:sp>
+        <p:nvSpPr>
+          <p:cNvPr id="97" name="Shape 97"/>
+          <p:cNvSpPr/>
+          <p:nvPr>
+            <p:ph idx="2" type="sldImg"/>
+          </p:nvPr>
+        </p:nvSpPr>
+        <p:spPr>
+          <a:xfrm>
+            <a:off x="381300" y="685800"/>
+            <a:ext cx="6096000" cy="3429000"/>
+          </a:xfrm>
+          <a:custGeom>
+            <a:pathLst>
+              <a:path extrusionOk="0" h="120000" w="120000">
+                <a:moveTo>
+                  <a:pt x="0" y="0"/>
+                </a:moveTo>
+                <a:lnTo>
+                  <a:pt x="120000" y="0"/>
+                </a:lnTo>
+                <a:lnTo>
+                  <a:pt x="120000" y="120000"/>
+                </a:lnTo>
+                <a:lnTo>
+                  <a:pt x="0" y="120000"/>
+                </a:lnTo>
+                <a:close/>
+              </a:path>
+            </a:pathLst>
+          </a:custGeom>
+          <a:noFill/>
+          <a:ln cap="flat" cmpd="sng" w="9525">
+            <a:solidFill>
+              <a:srgbClr val="000000"/>
+            </a:solidFill>
+            <a:prstDash val="solid"/>
+            <a:round/>
+            <a:headEnd len="med" w="med" type="none"/>
+            <a:tailEnd len="med" w="med" type="none"/>
+          </a:ln>
+        </p:spPr>
+      </p:sp>
+      <p:sp>
+        <p:nvSpPr>
+          <p:cNvPr id="98" name="Shape 98"/>
+          <p:cNvSpPr txBox="1"/>
+          <p:nvPr>
+            <p:ph idx="1" type="body"/>
+          </p:nvPr>
+        </p:nvSpPr>
+        <p:spPr>
+          <a:xfrm>
+            <a:off x="685800" y="4343400"/>
+            <a:ext cx="5486399" cy="4114800"/>
+          </a:xfrm>
+          <a:prstGeom prst="rect">
+            <a:avLst/>
+          </a:prstGeom>
+        </p:spPr>
+        <p:txBody>
+          <a:bodyPr anchorCtr="0" anchor="t" bIns="91425" lIns="91425" rIns="91425" tIns="91425">
+            <a:noAutofit/>
+          </a:bodyPr>
+          <a:lstStyle/>
+          <a:p>
+            <a:pPr>
+              <a:spcBef>
+                <a:spcPts val="0"/>
+              </a:spcBef>
+              <a:buNone/>
+            </a:pPr>
+            <a:r>
+              <a:t/>
+            </a:r>
+            <a:endParaRPr/>
+          </a:p>
+        </p:txBody>
+      </p:sp>
+    </p:spTree>
+  </p:cSld>
+  <p:clrMapOvr>
+    <a:masterClrMapping/>
+  </p:clrMapOvr>
+</p:notes>
+</file>
+
+<file path=ppt/notesSlides/notesSlide8.xml><?xml version="1.0" encoding="utf-8"?>
+<p:notes xmlns:a="http://schemas.openxmlformats.org/drawingml/2006/main" xmlns:r="http://schemas.openxmlformats.org/officeDocument/2006/relationships" xmlns:mc="http://schemas.openxmlformats.org/markup-compatibility/2006" xmlns:mv="urn:schemas-microsoft-com:mac:vml" xmlns:p="http://schemas.openxmlformats.org/presentationml/2006/main" xmlns:c="http://schemas.openxmlformats.org/drawingml/2006/chart" xmlns:dgm="http://schemas.openxmlformats.org/drawingml/2006/diagram" xmlns:o="urn:schemas-microsoft-com:office:office" xmlns:v="urn:schemas-microsoft-com:vml" xmlns:pvml="urn:schemas-microsoft-com:office:powerpoint" xmlns:com="http://schemas.openxmlformats.org/drawingml/2006/compatibility" xmlns:p14="http://schemas.microsoft.com/office/powerpoint/2010/main" showMasterPhAnim="0" showMasterSp="0">
+  <p:cSld>
+    <p:spTree>
+      <p:nvGrpSpPr>
+        <p:cNvPr id="102" name="Shape 102"/>
+        <p:cNvGrpSpPr/>
+        <p:nvPr/>
+      </p:nvGrpSpPr>
+      <p:grpSpPr>
+        <a:xfrm>
+          <a:off x="0" y="0"/>
+          <a:ext cx="0" cy="0"/>
+          <a:chOff x="0" y="0"/>
+          <a:chExt cx="0" cy="0"/>
+        </a:xfrm>
+      </p:grpSpPr>
+      <p:sp>
+        <p:nvSpPr>
+          <p:cNvPr id="103" name="Shape 103"/>
+          <p:cNvSpPr/>
+          <p:nvPr>
+            <p:ph idx="2" type="sldImg"/>
+          </p:nvPr>
+        </p:nvSpPr>
+        <p:spPr>
+          <a:xfrm>
+            <a:off x="381300" y="685800"/>
+            <a:ext cx="6096000" cy="3429000"/>
+          </a:xfrm>
+          <a:custGeom>
+            <a:pathLst>
+              <a:path extrusionOk="0" h="120000" w="120000">
+                <a:moveTo>
+                  <a:pt x="0" y="0"/>
+                </a:moveTo>
+                <a:lnTo>
+                  <a:pt x="120000" y="0"/>
+                </a:lnTo>
+                <a:lnTo>
+                  <a:pt x="120000" y="120000"/>
+                </a:lnTo>
+                <a:lnTo>
+                  <a:pt x="0" y="120000"/>
+                </a:lnTo>
+                <a:close/>
+              </a:path>
+            </a:pathLst>
+          </a:custGeom>
+          <a:noFill/>
+          <a:ln cap="flat" cmpd="sng" w="9525">
+            <a:solidFill>
+              <a:srgbClr val="000000"/>
+            </a:solidFill>
+            <a:prstDash val="solid"/>
+            <a:round/>
+            <a:headEnd len="med" w="med" type="none"/>
+            <a:tailEnd len="med" w="med" type="none"/>
+          </a:ln>
+        </p:spPr>
+      </p:sp>
+      <p:sp>
+        <p:nvSpPr>
+          <p:cNvPr id="104" name="Shape 104"/>
+          <p:cNvSpPr txBox="1"/>
+          <p:nvPr>
+            <p:ph idx="1" type="body"/>
+          </p:nvPr>
+        </p:nvSpPr>
+        <p:spPr>
+          <a:xfrm>
+            <a:off x="685800" y="4343400"/>
+            <a:ext cx="5486399" cy="4114800"/>
+          </a:xfrm>
+          <a:prstGeom prst="rect">
+            <a:avLst/>
+          </a:prstGeom>
+        </p:spPr>
+        <p:txBody>
+          <a:bodyPr anchorCtr="0" anchor="t" bIns="91425" lIns="91425" rIns="91425" tIns="91425">
+            <a:noAutofit/>
+          </a:bodyPr>
+          <a:lstStyle/>
+          <a:p>
+            <a:pPr>
+              <a:spcBef>
+                <a:spcPts val="0"/>
+              </a:spcBef>
+              <a:buNone/>
+            </a:pPr>
+            <a:r>
+              <a:t/>
+            </a:r>
+            <a:endParaRPr/>
+          </a:p>
+        </p:txBody>
+      </p:sp>
+    </p:spTree>
+  </p:cSld>
+  <p:clrMapOvr>
+    <a:masterClrMapping/>
+  </p:clrMapOvr>
+</p:notes>
+</file>
+
+<file path=ppt/notesSlides/notesSlide9.xml><?xml version="1.0" encoding="utf-8"?>
+<p:notes xmlns:a="http://schemas.openxmlformats.org/drawingml/2006/main" xmlns:r="http://schemas.openxmlformats.org/officeDocument/2006/relationships" xmlns:mc="http://schemas.openxmlformats.org/markup-compatibility/2006" xmlns:mv="urn:schemas-microsoft-com:mac:vml" xmlns:p="http://schemas.openxmlformats.org/presentationml/2006/main" xmlns:c="http://schemas.openxmlformats.org/drawingml/2006/chart" xmlns:dgm="http://schemas.openxmlformats.org/drawingml/2006/diagram" xmlns:o="urn:schemas-microsoft-com:office:office" xmlns:v="urn:schemas-microsoft-com:vml" xmlns:pvml="urn:schemas-microsoft-com:office:powerpoint" xmlns:com="http://schemas.openxmlformats.org/drawingml/2006/compatibility" xmlns:p14="http://schemas.microsoft.com/office/powerpoint/2010/main" showMasterPhAnim="0" showMasterSp="0">
+  <p:cSld>
+    <p:spTree>
+      <p:nvGrpSpPr>
+        <p:cNvPr id="108" name="Shape 108"/>
+        <p:cNvGrpSpPr/>
+        <p:nvPr/>
+      </p:nvGrpSpPr>
+      <p:grpSpPr>
+        <a:xfrm>
+          <a:off x="0" y="0"/>
+          <a:ext cx="0" cy="0"/>
+          <a:chOff x="0" y="0"/>
+          <a:chExt cx="0" cy="0"/>
+        </a:xfrm>
+      </p:grpSpPr>
+      <p:sp>
+        <p:nvSpPr>
+          <p:cNvPr id="109" name="Shape 109"/>
+          <p:cNvSpPr/>
+          <p:nvPr>
+            <p:ph idx="2" type="sldImg"/>
+          </p:nvPr>
+        </p:nvSpPr>
+        <p:spPr>
+          <a:xfrm>
+            <a:off x="381300" y="685800"/>
+            <a:ext cx="6096000" cy="3429000"/>
+          </a:xfrm>
+          <a:custGeom>
+            <a:pathLst>
+              <a:path extrusionOk="0" h="120000" w="120000">
+                <a:moveTo>
+                  <a:pt x="0" y="0"/>
+                </a:moveTo>
+                <a:lnTo>
+                  <a:pt x="120000" y="0"/>
+                </a:lnTo>
+                <a:lnTo>
+                  <a:pt x="120000" y="120000"/>
+                </a:lnTo>
+                <a:lnTo>
+                  <a:pt x="0" y="120000"/>
+                </a:lnTo>
+                <a:close/>
+              </a:path>
+            </a:pathLst>
+          </a:custGeom>
+          <a:noFill/>
+          <a:ln cap="flat" cmpd="sng" w="9525">
+            <a:solidFill>
+              <a:srgbClr val="000000"/>
+            </a:solidFill>
+            <a:prstDash val="solid"/>
+            <a:round/>
+            <a:headEnd len="med" w="med" type="none"/>
+            <a:tailEnd len="med" w="med" type="none"/>
+          </a:ln>
+        </p:spPr>
+      </p:sp>
+      <p:sp>
+        <p:nvSpPr>
+          <p:cNvPr id="110" name="Shape 110"/>
           <p:cNvSpPr txBox="1"/>
           <p:nvPr>
             <p:ph idx="1" type="body"/>
@@ -7167,7 +7485,7 @@
   <p:cSld>
     <p:spTree>
       <p:nvGrpSpPr>
-        <p:cNvPr id="112" name="Shape 112"/>
+        <p:cNvPr id="111" name="Shape 111"/>
         <p:cNvGrpSpPr/>
         <p:nvPr/>
       </p:nvGrpSpPr>
@@ -7181,7 +7499,7 @@
       </p:grpSpPr>
       <p:sp>
         <p:nvSpPr>
-          <p:cNvPr id="113" name="Shape 113"/>
+          <p:cNvPr id="112" name="Shape 112"/>
           <p:cNvSpPr txBox="1"/>
           <p:nvPr>
             <p:ph type="title"/>
@@ -7210,39 +7528,91 @@
             </a:pPr>
             <a:r>
               <a:rPr lang="en"/>
-              <a:t>Admin Abilities </a:t>
+              <a:t>Admins Abilities </a:t>
             </a:r>
           </a:p>
         </p:txBody>
       </p:sp>
-      <p:pic>
-        <p:nvPicPr>
-          <p:cNvPr id="114" name="Shape 114"/>
-          <p:cNvPicPr preferRelativeResize="0"/>
-          <p:nvPr/>
-        </p:nvPicPr>
-        <p:blipFill>
-          <a:blip r:embed="rId3">
-            <a:alphaModFix/>
-          </a:blip>
-          <a:stretch>
-            <a:fillRect/>
-          </a:stretch>
-        </p:blipFill>
-        <p:spPr>
-          <a:xfrm>
-            <a:off x="1314575" y="1152472"/>
-            <a:ext cx="6514838" cy="3595750"/>
-          </a:xfrm>
-          <a:prstGeom prst="rect">
-            <a:avLst/>
-          </a:prstGeom>
-          <a:noFill/>
-          <a:ln>
-            <a:noFill/>
-          </a:ln>
-        </p:spPr>
-      </p:pic>
+      <p:sp>
+        <p:nvSpPr>
+          <p:cNvPr id="113" name="Shape 113"/>
+          <p:cNvSpPr txBox="1"/>
+          <p:nvPr>
+            <p:ph idx="1" type="body"/>
+          </p:nvPr>
+        </p:nvSpPr>
+        <p:spPr>
+          <a:xfrm>
+            <a:off x="311700" y="1152475"/>
+            <a:ext cx="8520599" cy="3416400"/>
+          </a:xfrm>
+          <a:prstGeom prst="rect">
+            <a:avLst/>
+          </a:prstGeom>
+        </p:spPr>
+        <p:txBody>
+          <a:bodyPr anchorCtr="0" anchor="t" bIns="91425" lIns="91425" rIns="91425" tIns="91425">
+            <a:noAutofit/>
+          </a:bodyPr>
+          <a:lstStyle/>
+          <a:p>
+            <a:pPr indent="-228600" lvl="0" marL="457200" rtl="0">
+              <a:spcBef>
+                <a:spcPts val="0"/>
+              </a:spcBef>
+            </a:pPr>
+            <a:r>
+              <a:rPr lang="en"/>
+              <a:t>Admins can make modifications to the tax bracket.</a:t>
+            </a:r>
+          </a:p>
+          <a:p>
+            <a:pPr indent="-228600" lvl="0" marL="457200" rtl="0">
+              <a:spcBef>
+                <a:spcPts val="0"/>
+              </a:spcBef>
+            </a:pPr>
+            <a:r>
+              <a:rPr lang="en"/>
+              <a:t>They have the ability to add, delete, and modify tax brackets.</a:t>
+            </a:r>
+          </a:p>
+          <a:p>
+            <a:pPr indent="-228600" lvl="0" marL="457200" rtl="0">
+              <a:spcBef>
+                <a:spcPts val="0"/>
+              </a:spcBef>
+            </a:pPr>
+            <a:r>
+              <a:rPr lang="en"/>
+              <a:t>They can also pull and print data from taxpayer information. </a:t>
+            </a:r>
+          </a:p>
+          <a:p>
+            <a:pPr indent="-228600" lvl="0" marL="457200" rtl="0">
+              <a:spcBef>
+                <a:spcPts val="0"/>
+              </a:spcBef>
+            </a:pPr>
+            <a:r>
+              <a:rPr lang="en"/>
+              <a:t>Add other admins.</a:t>
+            </a:r>
+          </a:p>
+          <a:p>
+            <a:pPr lvl="0" rtl="0">
+              <a:spcBef>
+                <a:spcPts val="0"/>
+              </a:spcBef>
+              <a:buNone/>
+            </a:pPr>
+            <a:r>
+              <a:t/>
+            </a:r>
+            <a:endParaRPr/>
+          </a:p>
+        </p:txBody>
+      </p:sp>
     </p:spTree>
   </p:cSld>
   <p:clrMapOvr>
@@ -7259,7 +7629,7 @@
   <p:cSld>
     <p:spTree>
       <p:nvGrpSpPr>
-        <p:cNvPr id="118" name="Shape 118"/>
+        <p:cNvPr id="117" name="Shape 117"/>
         <p:cNvGrpSpPr/>
         <p:nvPr/>
       </p:nvGrpSpPr>
@@ -7273,7 +7643,7 @@
       </p:grpSpPr>
       <p:sp>
         <p:nvSpPr>
-          <p:cNvPr id="119" name="Shape 119"/>
+          <p:cNvPr id="118" name="Shape 118"/>
           <p:cNvSpPr txBox="1"/>
           <p:nvPr>
             <p:ph type="title"/>
@@ -7302,14 +7672,14 @@
             </a:pPr>
             <a:r>
               <a:rPr lang="en"/>
-              <a:t>Classes</a:t>
+              <a:t>Admin Abilities </a:t>
             </a:r>
           </a:p>
         </p:txBody>
       </p:sp>
       <p:pic>
         <p:nvPicPr>
-          <p:cNvPr id="120" name="Shape 120"/>
+          <p:cNvPr id="119" name="Shape 119"/>
           <p:cNvPicPr preferRelativeResize="0"/>
           <p:nvPr/>
         </p:nvPicPr>
@@ -7323,8 +7693,8 @@
         </p:blipFill>
         <p:spPr>
           <a:xfrm>
-            <a:off x="581353" y="53525"/>
-            <a:ext cx="7981293" cy="5143500"/>
+            <a:off x="1314575" y="1152472"/>
+            <a:ext cx="6514838" cy="3595750"/>
           </a:xfrm>
           <a:prstGeom prst="rect">
             <a:avLst/>
@@ -7351,7 +7721,7 @@
   <p:cSld>
     <p:spTree>
       <p:nvGrpSpPr>
-        <p:cNvPr id="124" name="Shape 124"/>
+        <p:cNvPr id="123" name="Shape 123"/>
         <p:cNvGrpSpPr/>
         <p:nvPr/>
       </p:nvGrpSpPr>
@@ -7365,7 +7735,7 @@
       </p:grpSpPr>
       <p:sp>
         <p:nvSpPr>
-          <p:cNvPr id="125" name="Shape 125"/>
+          <p:cNvPr id="124" name="Shape 124"/>
           <p:cNvSpPr txBox="1"/>
           <p:nvPr>
             <p:ph type="title"/>
@@ -7394,7 +7764,7 @@
             </a:pPr>
             <a:r>
               <a:rPr lang="en"/>
-              <a:t>Tools Used</a:t>
+              <a:t>Design</a:t>
             </a:r>
           </a:p>
         </p:txBody>
@@ -7415,7 +7785,7 @@
   <p:cSld>
     <p:spTree>
       <p:nvGrpSpPr>
-        <p:cNvPr id="129" name="Shape 129"/>
+        <p:cNvPr id="128" name="Shape 128"/>
         <p:cNvGrpSpPr/>
         <p:nvPr/>
       </p:nvGrpSpPr>
@@ -7429,7 +7799,7 @@
       </p:grpSpPr>
       <p:sp>
         <p:nvSpPr>
-          <p:cNvPr id="130" name="Shape 130"/>
+          <p:cNvPr id="129" name="Shape 129"/>
           <p:cNvSpPr txBox="1"/>
           <p:nvPr>
             <p:ph type="title"/>
@@ -7450,7 +7820,7 @@
           </a:bodyPr>
           <a:lstStyle/>
           <a:p>
-            <a:pPr lvl="0" rtl="0">
+            <a:pPr>
               <a:spcBef>
                 <a:spcPts val="0"/>
               </a:spcBef>
@@ -7458,215 +7828,28 @@
             </a:pPr>
             <a:r>
               <a:rPr lang="en"/>
-              <a:t>Languages </a:t>
-            </a:r>
-          </a:p>
-        </p:txBody>
-      </p:sp>
-      <p:sp>
-        <p:nvSpPr>
-          <p:cNvPr id="131" name="Shape 131"/>
-          <p:cNvSpPr txBox="1"/>
-          <p:nvPr>
-            <p:ph idx="1" type="body"/>
-          </p:nvPr>
-        </p:nvSpPr>
-        <p:spPr>
-          <a:xfrm>
-            <a:off x="311700" y="1152475"/>
-            <a:ext cx="8520599" cy="3416400"/>
-          </a:xfrm>
-          <a:prstGeom prst="rect">
-            <a:avLst/>
-          </a:prstGeom>
-        </p:spPr>
-        <p:txBody>
-          <a:bodyPr anchorCtr="0" anchor="t" bIns="91425" lIns="91425" rIns="91425" tIns="91425">
-            <a:noAutofit/>
-          </a:bodyPr>
-          <a:lstStyle/>
-          <a:p>
-            <a:pPr indent="-228600" lvl="0" marL="457200" rtl="0">
-              <a:spcBef>
-                <a:spcPts val="0"/>
-              </a:spcBef>
-            </a:pPr>
-            <a:r>
-              <a:rPr lang="en"/>
-              <a:t>PHP</a:t>
-            </a:r>
-          </a:p>
-          <a:p>
-            <a:pPr indent="-228600" lvl="1" marL="914400" rtl="0">
-              <a:spcBef>
-                <a:spcPts val="0"/>
-              </a:spcBef>
-            </a:pPr>
-            <a:r>
-              <a:rPr lang="en"/>
-              <a:t>Server Side </a:t>
-            </a:r>
-          </a:p>
-          <a:p>
-            <a:pPr indent="-228600" lvl="0" marL="457200" rtl="0">
-              <a:spcBef>
-                <a:spcPts val="0"/>
-              </a:spcBef>
-            </a:pPr>
-            <a:r>
-              <a:rPr lang="en"/>
-              <a:t>HTML5</a:t>
-            </a:r>
-          </a:p>
-          <a:p>
-            <a:pPr indent="-228600" lvl="1" marL="914400" rtl="0">
-              <a:spcBef>
-                <a:spcPts val="0"/>
-              </a:spcBef>
-            </a:pPr>
-            <a:r>
-              <a:rPr lang="en"/>
-              <a:t>Website</a:t>
-            </a:r>
-          </a:p>
-          <a:p>
-            <a:pPr indent="-228600" lvl="0" marL="457200" rtl="0">
-              <a:spcBef>
-                <a:spcPts val="0"/>
-              </a:spcBef>
-            </a:pPr>
-            <a:r>
-              <a:rPr lang="en"/>
-              <a:t>SQL</a:t>
-            </a:r>
-          </a:p>
-          <a:p>
-            <a:pPr indent="-228600" lvl="1" marL="914400" rtl="0">
-              <a:spcBef>
-                <a:spcPts val="0"/>
-              </a:spcBef>
-            </a:pPr>
-            <a:r>
-              <a:rPr lang="en"/>
-              <a:t>Database</a:t>
-            </a:r>
-          </a:p>
-          <a:p>
-            <a:pPr indent="-228600" lvl="0" marL="457200" rtl="0">
-              <a:spcBef>
-                <a:spcPts val="0"/>
-              </a:spcBef>
-            </a:pPr>
-            <a:r>
-              <a:rPr lang="en"/>
-              <a:t>JavaScript</a:t>
-            </a:r>
-          </a:p>
-          <a:p>
-            <a:pPr indent="-228600" lvl="1" marL="914400" rtl="0">
-              <a:spcBef>
-                <a:spcPts val="0"/>
-              </a:spcBef>
-            </a:pPr>
-            <a:r>
-              <a:rPr lang="en"/>
-              <a:t>Form verification </a:t>
-            </a:r>
-          </a:p>
-          <a:p>
-            <a:pPr indent="-228600" lvl="0" marL="457200" rtl="0">
-              <a:spcBef>
-                <a:spcPts val="0"/>
-              </a:spcBef>
-            </a:pPr>
-            <a:r>
-              <a:rPr lang="en"/>
-              <a:t>CSS</a:t>
-            </a:r>
-          </a:p>
-          <a:p>
-            <a:pPr indent="-228600" lvl="1" marL="914400" rtl="0">
-              <a:spcBef>
-                <a:spcPts val="0"/>
-              </a:spcBef>
-            </a:pPr>
-            <a:r>
-              <a:rPr lang="en"/>
-              <a:t>Style </a:t>
-            </a:r>
-          </a:p>
-          <a:p>
-            <a:pPr indent="0" lvl="0" marL="0" rtl="0">
-              <a:spcBef>
-                <a:spcPts val="0"/>
-              </a:spcBef>
-              <a:buNone/>
-            </a:pPr>
-            <a:r>
-              <a:rPr lang="en"/>
-              <a:t> </a:t>
-            </a:r>
-          </a:p>
-          <a:p>
-            <a:pPr indent="0" lvl="0" marL="0" rtl="0">
-              <a:spcBef>
-                <a:spcPts val="0"/>
-              </a:spcBef>
-              <a:buNone/>
-            </a:pPr>
-            <a:r>
-              <a:t/>
-            </a:r>
-            <a:endParaRPr/>
+              <a:t>HLA</a:t>
+            </a:r>
           </a:p>
         </p:txBody>
       </p:sp>
       <p:pic>
         <p:nvPicPr>
-          <p:cNvPr id="132" name="Shape 132"/>
+          <p:cNvPr id="130" name="Shape 130"/>
           <p:cNvPicPr preferRelativeResize="0"/>
           <p:nvPr/>
         </p:nvPicPr>
-        <p:blipFill>
+        <p:blipFill rotWithShape="1">
           <a:blip r:embed="rId3">
             <a:alphaModFix/>
           </a:blip>
-          <a:stretch>
-            <a:fillRect/>
-          </a:stretch>
+          <a:srcRect b="55647" l="0" r="19139" t="3691"/>
+          <a:stretch/>
         </p:blipFill>
         <p:spPr>
           <a:xfrm>
-            <a:off x="4758306" y="673206"/>
-            <a:ext cx="3956174" cy="2632650"/>
-          </a:xfrm>
-          <a:prstGeom prst="rect">
-            <a:avLst/>
-          </a:prstGeom>
-          <a:noFill/>
-          <a:ln>
-            <a:noFill/>
-          </a:ln>
-        </p:spPr>
-      </p:pic>
-      <p:pic>
-        <p:nvPicPr>
-          <p:cNvPr id="133" name="Shape 133"/>
-          <p:cNvPicPr preferRelativeResize="0"/>
-          <p:nvPr/>
-        </p:nvPicPr>
-        <p:blipFill>
-          <a:blip r:embed="rId4">
-            <a:alphaModFix/>
-          </a:blip>
-          <a:stretch>
-            <a:fillRect/>
-          </a:stretch>
-        </p:blipFill>
-        <p:spPr>
-          <a:xfrm>
-            <a:off x="3315812" y="2432887"/>
-            <a:ext cx="2733675" cy="1666875"/>
+            <a:off x="1708500" y="1226725"/>
+            <a:ext cx="5726999" cy="3727475"/>
           </a:xfrm>
           <a:prstGeom prst="rect">
             <a:avLst/>
@@ -7693,7 +7876,7 @@
   <p:cSld>
     <p:spTree>
       <p:nvGrpSpPr>
-        <p:cNvPr id="137" name="Shape 137"/>
+        <p:cNvPr id="134" name="Shape 134"/>
         <p:cNvGrpSpPr/>
         <p:nvPr/>
       </p:nvGrpSpPr>
@@ -7707,7 +7890,7 @@
       </p:grpSpPr>
       <p:sp>
         <p:nvSpPr>
-          <p:cNvPr id="138" name="Shape 138"/>
+          <p:cNvPr id="135" name="Shape 135"/>
           <p:cNvSpPr txBox="1"/>
           <p:nvPr>
             <p:ph type="title"/>
@@ -7736,71 +7919,14 @@
             </a:pPr>
             <a:r>
               <a:rPr lang="en"/>
-              <a:t>GitHub </a:t>
-            </a:r>
-          </a:p>
-        </p:txBody>
-      </p:sp>
-      <p:sp>
-        <p:nvSpPr>
-          <p:cNvPr id="139" name="Shape 139"/>
-          <p:cNvSpPr txBox="1"/>
-          <p:nvPr>
-            <p:ph idx="1" type="body"/>
-          </p:nvPr>
-        </p:nvSpPr>
-        <p:spPr>
-          <a:xfrm>
-            <a:off x="311700" y="1152475"/>
-            <a:ext cx="3572699" cy="3416400"/>
-          </a:xfrm>
-          <a:prstGeom prst="rect">
-            <a:avLst/>
-          </a:prstGeom>
-        </p:spPr>
-        <p:txBody>
-          <a:bodyPr anchorCtr="0" anchor="t" bIns="91425" lIns="91425" rIns="91425" tIns="91425">
-            <a:noAutofit/>
-          </a:bodyPr>
-          <a:lstStyle/>
-          <a:p>
-            <a:pPr indent="-228600" lvl="0" marL="457200" rtl="0">
-              <a:spcBef>
-                <a:spcPts val="0"/>
-              </a:spcBef>
-            </a:pPr>
-            <a:r>
-              <a:rPr lang="en"/>
-              <a:t>Code repository</a:t>
-            </a:r>
-          </a:p>
-          <a:p>
-            <a:pPr indent="-228600" lvl="0" marL="457200" rtl="0">
-              <a:spcBef>
-                <a:spcPts val="0"/>
-              </a:spcBef>
-            </a:pPr>
-            <a:r>
-              <a:rPr lang="en"/>
-              <a:t>Allows each user to update your code on your own machine, then commit it to the repository, and update the project </a:t>
-            </a:r>
-          </a:p>
-          <a:p>
-            <a:pPr indent="-228600" lvl="0" marL="457200">
-              <a:spcBef>
-                <a:spcPts val="0"/>
-              </a:spcBef>
-            </a:pPr>
-            <a:r>
-              <a:rPr lang="en"/>
-              <a:t>Also, shows changes that have been updated by each user</a:t>
+              <a:t>Classes</a:t>
             </a:r>
           </a:p>
         </p:txBody>
       </p:sp>
       <p:pic>
         <p:nvPicPr>
-          <p:cNvPr id="140" name="Shape 140"/>
+          <p:cNvPr id="136" name="Shape 136"/>
           <p:cNvPicPr preferRelativeResize="0"/>
           <p:nvPr/>
         </p:nvPicPr>
@@ -7814,8 +7940,8 @@
         </p:blipFill>
         <p:spPr>
           <a:xfrm>
-            <a:off x="4294700" y="1103475"/>
-            <a:ext cx="4512300" cy="3008200"/>
+            <a:off x="581353" y="53525"/>
+            <a:ext cx="7981293" cy="5143500"/>
           </a:xfrm>
           <a:prstGeom prst="rect">
             <a:avLst/>
@@ -7842,7 +7968,7 @@
   <p:cSld>
     <p:spTree>
       <p:nvGrpSpPr>
-        <p:cNvPr id="144" name="Shape 144"/>
+        <p:cNvPr id="140" name="Shape 140"/>
         <p:cNvGrpSpPr/>
         <p:nvPr/>
       </p:nvGrpSpPr>
@@ -7856,7 +7982,7 @@
       </p:grpSpPr>
       <p:sp>
         <p:nvSpPr>
-          <p:cNvPr id="145" name="Shape 145"/>
+          <p:cNvPr id="141" name="Shape 141"/>
           <p:cNvSpPr txBox="1"/>
           <p:nvPr>
             <p:ph type="title"/>
@@ -7864,15 +7990,15 @@
         </p:nvSpPr>
         <p:spPr>
           <a:xfrm>
-            <a:off x="311700" y="445025"/>
-            <a:ext cx="8520599" cy="572699"/>
+            <a:off x="671250" y="2141250"/>
+            <a:ext cx="7852199" cy="861000"/>
           </a:xfrm>
           <a:prstGeom prst="rect">
             <a:avLst/>
           </a:prstGeom>
         </p:spPr>
         <p:txBody>
-          <a:bodyPr anchorCtr="0" anchor="t" bIns="91425" lIns="91425" rIns="91425" tIns="91425">
+          <a:bodyPr anchorCtr="0" anchor="ctr" bIns="91425" lIns="91425" rIns="91425" tIns="91425">
             <a:noAutofit/>
           </a:bodyPr>
           <a:lstStyle/>
@@ -7885,97 +8011,11 @@
             </a:pPr>
             <a:r>
               <a:rPr lang="en"/>
-              <a:t>Source Tree</a:t>
+              <a:t>Tools Used</a:t>
             </a:r>
           </a:p>
         </p:txBody>
       </p:sp>
-      <p:sp>
-        <p:nvSpPr>
-          <p:cNvPr id="146" name="Shape 146"/>
-          <p:cNvSpPr txBox="1"/>
-          <p:nvPr>
-            <p:ph idx="1" type="body"/>
-          </p:nvPr>
-        </p:nvSpPr>
-        <p:spPr>
-          <a:xfrm>
-            <a:off x="311700" y="1152475"/>
-            <a:ext cx="8520599" cy="3416400"/>
-          </a:xfrm>
-          <a:prstGeom prst="rect">
-            <a:avLst/>
-          </a:prstGeom>
-        </p:spPr>
-        <p:txBody>
-          <a:bodyPr anchorCtr="0" anchor="t" bIns="91425" lIns="91425" rIns="91425" tIns="91425">
-            <a:noAutofit/>
-          </a:bodyPr>
-          <a:lstStyle/>
-          <a:p>
-            <a:pPr indent="-228600" lvl="0" marL="457200" rtl="0">
-              <a:spcBef>
-                <a:spcPts val="0"/>
-              </a:spcBef>
-            </a:pPr>
-            <a:r>
-              <a:rPr lang="en"/>
-              <a:t>3rd party Git client</a:t>
-            </a:r>
-          </a:p>
-          <a:p>
-            <a:pPr indent="-228600" lvl="0" marL="457200" rtl="0">
-              <a:spcBef>
-                <a:spcPts val="0"/>
-              </a:spcBef>
-            </a:pPr>
-            <a:r>
-              <a:rPr lang="en"/>
-              <a:t>Used for pushing and pulling code</a:t>
-            </a:r>
-          </a:p>
-          <a:p>
-            <a:pPr lvl="0" rtl="0">
-              <a:spcBef>
-                <a:spcPts val="0"/>
-              </a:spcBef>
-              <a:buNone/>
-            </a:pPr>
-            <a:r>
-              <a:t/>
-            </a:r>
-            <a:endParaRPr/>
-          </a:p>
-        </p:txBody>
-      </p:sp>
-      <p:pic>
-        <p:nvPicPr>
-          <p:cNvPr id="147" name="Shape 147"/>
-          <p:cNvPicPr preferRelativeResize="0"/>
-          <p:nvPr/>
-        </p:nvPicPr>
-        <p:blipFill>
-          <a:blip r:embed="rId3">
-            <a:alphaModFix/>
-          </a:blip>
-          <a:stretch>
-            <a:fillRect/>
-          </a:stretch>
-        </p:blipFill>
-        <p:spPr>
-          <a:xfrm>
-            <a:off x="2690875" y="2311254"/>
-            <a:ext cx="6141424" cy="1535350"/>
-          </a:xfrm>
-          <a:prstGeom prst="rect">
-            <a:avLst/>
-          </a:prstGeom>
-          <a:noFill/>
-          <a:ln>
-            <a:noFill/>
-          </a:ln>
-        </p:spPr>
-      </p:pic>
     </p:spTree>
   </p:cSld>
   <p:clrMapOvr>
@@ -7992,7 +8032,7 @@
   <p:cSld>
     <p:spTree>
       <p:nvGrpSpPr>
-        <p:cNvPr id="151" name="Shape 151"/>
+        <p:cNvPr id="145" name="Shape 145"/>
         <p:cNvGrpSpPr/>
         <p:nvPr/>
       </p:nvGrpSpPr>
@@ -8006,7 +8046,7 @@
       </p:grpSpPr>
       <p:sp>
         <p:nvSpPr>
-          <p:cNvPr id="152" name="Shape 152"/>
+          <p:cNvPr id="146" name="Shape 146"/>
           <p:cNvSpPr txBox="1"/>
           <p:nvPr>
             <p:ph type="title"/>
@@ -8027,7 +8067,7 @@
           </a:bodyPr>
           <a:lstStyle/>
           <a:p>
-            <a:pPr>
+            <a:pPr lvl="0" rtl="0">
               <a:spcBef>
                 <a:spcPts val="0"/>
               </a:spcBef>
@@ -8035,14 +8075,14 @@
             </a:pPr>
             <a:r>
               <a:rPr lang="en"/>
-              <a:t>Cyberduck</a:t>
+              <a:t>Languages </a:t>
             </a:r>
           </a:p>
         </p:txBody>
       </p:sp>
       <p:sp>
         <p:nvSpPr>
-          <p:cNvPr id="153" name="Shape 153"/>
+          <p:cNvPr id="147" name="Shape 147"/>
           <p:cNvSpPr txBox="1"/>
           <p:nvPr>
             <p:ph idx="1" type="body"/>
@@ -8050,8 +8090,8 @@
         </p:nvSpPr>
         <p:spPr>
           <a:xfrm>
-            <a:off x="3848700" y="1152475"/>
-            <a:ext cx="4983600" cy="3416400"/>
+            <a:off x="311700" y="1152475"/>
+            <a:ext cx="8520599" cy="3416400"/>
           </a:xfrm>
           <a:prstGeom prst="rect">
             <a:avLst/>
@@ -8070,11 +8110,122 @@
             </a:pPr>
             <a:r>
               <a:rPr lang="en"/>
-              <a:t>FTP client to upload our source files to our web server. </a:t>
-            </a:r>
-          </a:p>
-          <a:p>
-            <a:pPr>
+              <a:t>PHP</a:t>
+            </a:r>
+          </a:p>
+          <a:p>
+            <a:pPr indent="-228600" lvl="1" marL="914400" rtl="0">
+              <a:spcBef>
+                <a:spcPts val="0"/>
+              </a:spcBef>
+            </a:pPr>
+            <a:r>
+              <a:rPr lang="en"/>
+              <a:t>Server Side </a:t>
+            </a:r>
+          </a:p>
+          <a:p>
+            <a:pPr indent="-228600" lvl="0" marL="457200" rtl="0">
+              <a:spcBef>
+                <a:spcPts val="0"/>
+              </a:spcBef>
+            </a:pPr>
+            <a:r>
+              <a:rPr lang="en"/>
+              <a:t>HTML5</a:t>
+            </a:r>
+          </a:p>
+          <a:p>
+            <a:pPr indent="-228600" lvl="1" marL="914400" rtl="0">
+              <a:spcBef>
+                <a:spcPts val="0"/>
+              </a:spcBef>
+            </a:pPr>
+            <a:r>
+              <a:rPr lang="en"/>
+              <a:t>Website</a:t>
+            </a:r>
+          </a:p>
+          <a:p>
+            <a:pPr indent="-228600" lvl="0" marL="457200" rtl="0">
+              <a:spcBef>
+                <a:spcPts val="0"/>
+              </a:spcBef>
+            </a:pPr>
+            <a:r>
+              <a:rPr lang="en"/>
+              <a:t>SQL</a:t>
+            </a:r>
+          </a:p>
+          <a:p>
+            <a:pPr indent="-228600" lvl="1" marL="914400" rtl="0">
+              <a:spcBef>
+                <a:spcPts val="0"/>
+              </a:spcBef>
+            </a:pPr>
+            <a:r>
+              <a:rPr lang="en"/>
+              <a:t>Database</a:t>
+            </a:r>
+          </a:p>
+          <a:p>
+            <a:pPr indent="-228600" lvl="0" marL="457200" rtl="0">
+              <a:spcBef>
+                <a:spcPts val="0"/>
+              </a:spcBef>
+            </a:pPr>
+            <a:r>
+              <a:rPr lang="en"/>
+              <a:t>JavaScript</a:t>
+            </a:r>
+          </a:p>
+          <a:p>
+            <a:pPr indent="-228600" lvl="1" marL="914400" rtl="0">
+              <a:spcBef>
+                <a:spcPts val="0"/>
+              </a:spcBef>
+            </a:pPr>
+            <a:r>
+              <a:rPr lang="en"/>
+              <a:t>Form verification </a:t>
+            </a:r>
+          </a:p>
+          <a:p>
+            <a:pPr indent="-228600" lvl="0" marL="457200" rtl="0">
+              <a:spcBef>
+                <a:spcPts val="0"/>
+              </a:spcBef>
+            </a:pPr>
+            <a:r>
+              <a:rPr lang="en"/>
+              <a:t>CSS</a:t>
+            </a:r>
+          </a:p>
+          <a:p>
+            <a:pPr indent="-228600" lvl="1" marL="914400" rtl="0">
+              <a:spcBef>
+                <a:spcPts val="0"/>
+              </a:spcBef>
+            </a:pPr>
+            <a:r>
+              <a:rPr lang="en"/>
+              <a:t>Style </a:t>
+            </a:r>
+          </a:p>
+          <a:p>
+            <a:pPr indent="0" lvl="0" marL="0" rtl="0">
+              <a:spcBef>
+                <a:spcPts val="0"/>
+              </a:spcBef>
+              <a:buNone/>
+            </a:pPr>
+            <a:r>
+              <a:rPr lang="en"/>
+              <a:t> </a:t>
+            </a:r>
+          </a:p>
+          <a:p>
+            <a:pPr indent="0" lvl="0" marL="0" rtl="0">
               <a:spcBef>
                 <a:spcPts val="0"/>
               </a:spcBef>
@@ -8089,7 +8240,7 @@
       </p:sp>
       <p:pic>
         <p:nvPicPr>
-          <p:cNvPr id="154" name="Shape 154"/>
+          <p:cNvPr id="148" name="Shape 148"/>
           <p:cNvPicPr preferRelativeResize="0"/>
           <p:nvPr/>
         </p:nvPicPr>
@@ -8103,8 +8254,36 @@
         </p:blipFill>
         <p:spPr>
           <a:xfrm>
-            <a:off x="311700" y="1031875"/>
-            <a:ext cx="3537000" cy="3537000"/>
+            <a:off x="4758306" y="673206"/>
+            <a:ext cx="3956174" cy="2632650"/>
+          </a:xfrm>
+          <a:prstGeom prst="rect">
+            <a:avLst/>
+          </a:prstGeom>
+          <a:noFill/>
+          <a:ln>
+            <a:noFill/>
+          </a:ln>
+        </p:spPr>
+      </p:pic>
+      <p:pic>
+        <p:nvPicPr>
+          <p:cNvPr id="149" name="Shape 149"/>
+          <p:cNvPicPr preferRelativeResize="0"/>
+          <p:nvPr/>
+        </p:nvPicPr>
+        <p:blipFill>
+          <a:blip r:embed="rId4">
+            <a:alphaModFix/>
+          </a:blip>
+          <a:stretch>
+            <a:fillRect/>
+          </a:stretch>
+        </p:blipFill>
+        <p:spPr>
+          <a:xfrm>
+            <a:off x="3315812" y="2432887"/>
+            <a:ext cx="2733675" cy="1666875"/>
           </a:xfrm>
           <a:prstGeom prst="rect">
             <a:avLst/>
@@ -8131,7 +8310,7 @@
   <p:cSld>
     <p:spTree>
       <p:nvGrpSpPr>
-        <p:cNvPr id="158" name="Shape 158"/>
+        <p:cNvPr id="153" name="Shape 153"/>
         <p:cNvGrpSpPr/>
         <p:nvPr/>
       </p:nvGrpSpPr>
@@ -8145,7 +8324,7 @@
       </p:grpSpPr>
       <p:sp>
         <p:nvSpPr>
-          <p:cNvPr id="159" name="Shape 159"/>
+          <p:cNvPr id="154" name="Shape 154"/>
           <p:cNvSpPr txBox="1"/>
           <p:nvPr>
             <p:ph type="title"/>
@@ -8174,14 +8353,14 @@
             </a:pPr>
             <a:r>
               <a:rPr lang="en"/>
-              <a:t>MySQL Workbench</a:t>
+              <a:t>GitHub </a:t>
             </a:r>
           </a:p>
         </p:txBody>
       </p:sp>
       <p:sp>
         <p:nvSpPr>
-          <p:cNvPr id="160" name="Shape 160"/>
+          <p:cNvPr id="155" name="Shape 155"/>
           <p:cNvSpPr txBox="1"/>
           <p:nvPr>
             <p:ph idx="1" type="body"/>
@@ -8189,8 +8368,8 @@
         </p:nvSpPr>
         <p:spPr>
           <a:xfrm>
-            <a:off x="4035125" y="1152475"/>
-            <a:ext cx="4859099" cy="3596699"/>
+            <a:off x="311700" y="1152475"/>
+            <a:ext cx="3572699" cy="3416400"/>
           </a:xfrm>
           <a:prstGeom prst="rect">
             <a:avLst/>
@@ -8209,7 +8388,7 @@
             </a:pPr>
             <a:r>
               <a:rPr lang="en"/>
-              <a:t>Creating and maintaining database</a:t>
+              <a:t>Code repository</a:t>
             </a:r>
           </a:p>
           <a:p>
@@ -8220,26 +8399,25 @@
             </a:pPr>
             <a:r>
               <a:rPr lang="en"/>
-              <a:t>All taxpayer information will be stored in database</a:t>
-            </a:r>
-          </a:p>
-          <a:p>
-            <a:pPr lvl="0" rtl="0">
-              <a:spcBef>
-                <a:spcPts val="0"/>
-              </a:spcBef>
-              <a:buNone/>
-            </a:pPr>
-            <a:r>
-              <a:t/>
-            </a:r>
-            <a:endParaRPr/>
+              <a:t>Allows each user to update your code on your own machine, then commit it to the repository, and update the project </a:t>
+            </a:r>
+          </a:p>
+          <a:p>
+            <a:pPr indent="-228600" lvl="0" marL="457200">
+              <a:spcBef>
+                <a:spcPts val="0"/>
+              </a:spcBef>
+            </a:pPr>
+            <a:r>
+              <a:rPr lang="en"/>
+              <a:t>Also, shows changes that have been updated by each user</a:t>
+            </a:r>
           </a:p>
         </p:txBody>
       </p:sp>
       <p:pic>
         <p:nvPicPr>
-          <p:cNvPr id="161" name="Shape 161"/>
+          <p:cNvPr id="156" name="Shape 156"/>
           <p:cNvPicPr preferRelativeResize="0"/>
           <p:nvPr/>
         </p:nvPicPr>
@@ -8253,8 +8431,8 @@
         </p:blipFill>
         <p:spPr>
           <a:xfrm>
-            <a:off x="311700" y="1152474"/>
-            <a:ext cx="3723425" cy="3723425"/>
+            <a:off x="4294700" y="1103475"/>
+            <a:ext cx="4512300" cy="3008200"/>
           </a:xfrm>
           <a:prstGeom prst="rect">
             <a:avLst/>
@@ -8281,7 +8459,7 @@
   <p:cSld>
     <p:spTree>
       <p:nvGrpSpPr>
-        <p:cNvPr id="165" name="Shape 165"/>
+        <p:cNvPr id="160" name="Shape 160"/>
         <p:cNvGrpSpPr/>
         <p:nvPr/>
       </p:nvGrpSpPr>
@@ -8295,7 +8473,7 @@
       </p:grpSpPr>
       <p:sp>
         <p:nvSpPr>
-          <p:cNvPr id="166" name="Shape 166"/>
+          <p:cNvPr id="161" name="Shape 161"/>
           <p:cNvSpPr txBox="1"/>
           <p:nvPr>
             <p:ph type="title"/>
@@ -8303,15 +8481,15 @@
         </p:nvSpPr>
         <p:spPr>
           <a:xfrm>
-            <a:off x="671250" y="2141250"/>
-            <a:ext cx="7852199" cy="861000"/>
+            <a:off x="311700" y="445025"/>
+            <a:ext cx="8520599" cy="572699"/>
           </a:xfrm>
           <a:prstGeom prst="rect">
             <a:avLst/>
           </a:prstGeom>
         </p:spPr>
         <p:txBody>
-          <a:bodyPr anchorCtr="0" anchor="ctr" bIns="91425" lIns="91425" rIns="91425" tIns="91425">
+          <a:bodyPr anchorCtr="0" anchor="t" bIns="91425" lIns="91425" rIns="91425" tIns="91425">
             <a:noAutofit/>
           </a:bodyPr>
           <a:lstStyle/>
@@ -8324,11 +8502,97 @@
             </a:pPr>
             <a:r>
               <a:rPr lang="en"/>
-              <a:t>Referenced Materials</a:t>
+              <a:t>Source Tree</a:t>
             </a:r>
           </a:p>
         </p:txBody>
       </p:sp>
+      <p:sp>
+        <p:nvSpPr>
+          <p:cNvPr id="162" name="Shape 162"/>
+          <p:cNvSpPr txBox="1"/>
+          <p:nvPr>
+            <p:ph idx="1" type="body"/>
+          </p:nvPr>
+        </p:nvSpPr>
+        <p:spPr>
+          <a:xfrm>
+            <a:off x="311700" y="1152475"/>
+            <a:ext cx="8520599" cy="3416400"/>
+          </a:xfrm>
+          <a:prstGeom prst="rect">
+            <a:avLst/>
+          </a:prstGeom>
+        </p:spPr>
+        <p:txBody>
+          <a:bodyPr anchorCtr="0" anchor="t" bIns="91425" lIns="91425" rIns="91425" tIns="91425">
+            <a:noAutofit/>
+          </a:bodyPr>
+          <a:lstStyle/>
+          <a:p>
+            <a:pPr indent="-228600" lvl="0" marL="457200" rtl="0">
+              <a:spcBef>
+                <a:spcPts val="0"/>
+              </a:spcBef>
+            </a:pPr>
+            <a:r>
+              <a:rPr lang="en"/>
+              <a:t>3rd party Git client</a:t>
+            </a:r>
+          </a:p>
+          <a:p>
+            <a:pPr indent="-228600" lvl="0" marL="457200" rtl="0">
+              <a:spcBef>
+                <a:spcPts val="0"/>
+              </a:spcBef>
+            </a:pPr>
+            <a:r>
+              <a:rPr lang="en"/>
+              <a:t>Used for pushing and pulling code</a:t>
+            </a:r>
+          </a:p>
+          <a:p>
+            <a:pPr lvl="0" rtl="0">
+              <a:spcBef>
+                <a:spcPts val="0"/>
+              </a:spcBef>
+              <a:buNone/>
+            </a:pPr>
+            <a:r>
+              <a:t/>
+            </a:r>
+            <a:endParaRPr/>
+          </a:p>
+        </p:txBody>
+      </p:sp>
+      <p:pic>
+        <p:nvPicPr>
+          <p:cNvPr id="163" name="Shape 163"/>
+          <p:cNvPicPr preferRelativeResize="0"/>
+          <p:nvPr/>
+        </p:nvPicPr>
+        <p:blipFill>
+          <a:blip r:embed="rId3">
+            <a:alphaModFix/>
+          </a:blip>
+          <a:stretch>
+            <a:fillRect/>
+          </a:stretch>
+        </p:blipFill>
+        <p:spPr>
+          <a:xfrm>
+            <a:off x="2690875" y="2311254"/>
+            <a:ext cx="6141424" cy="1535350"/>
+          </a:xfrm>
+          <a:prstGeom prst="rect">
+            <a:avLst/>
+          </a:prstGeom>
+          <a:noFill/>
+          <a:ln>
+            <a:noFill/>
+          </a:ln>
+        </p:spPr>
+      </p:pic>
     </p:spTree>
   </p:cSld>
   <p:clrMapOvr>
@@ -8345,7 +8609,7 @@
   <p:cSld>
     <p:spTree>
       <p:nvGrpSpPr>
-        <p:cNvPr id="170" name="Shape 170"/>
+        <p:cNvPr id="167" name="Shape 167"/>
         <p:cNvGrpSpPr/>
         <p:nvPr/>
       </p:nvGrpSpPr>
@@ -8359,7 +8623,7 @@
       </p:grpSpPr>
       <p:sp>
         <p:nvSpPr>
-          <p:cNvPr id="171" name="Shape 171"/>
+          <p:cNvPr id="168" name="Shape 168"/>
           <p:cNvSpPr txBox="1"/>
           <p:nvPr>
             <p:ph type="title"/>
@@ -8388,14 +8652,14 @@
             </a:pPr>
             <a:r>
               <a:rPr lang="en"/>
-              <a:t>Bootstrap</a:t>
+              <a:t>Cyberduck</a:t>
             </a:r>
           </a:p>
         </p:txBody>
       </p:sp>
       <p:sp>
         <p:nvSpPr>
-          <p:cNvPr id="172" name="Shape 172"/>
+          <p:cNvPr id="169" name="Shape 169"/>
           <p:cNvSpPr txBox="1"/>
           <p:nvPr>
             <p:ph idx="1" type="body"/>
@@ -8403,8 +8667,8 @@
         </p:nvSpPr>
         <p:spPr>
           <a:xfrm>
-            <a:off x="311700" y="1152475"/>
-            <a:ext cx="4081499" cy="3416400"/>
+            <a:off x="3848700" y="1152475"/>
+            <a:ext cx="4983600" cy="3416400"/>
           </a:xfrm>
           <a:prstGeom prst="rect">
             <a:avLst/>
@@ -8423,80 +8687,26 @@
             </a:pPr>
             <a:r>
               <a:rPr lang="en"/>
-              <a:t>Built in HTML, CSS, and JS tools</a:t>
-            </a:r>
-          </a:p>
-          <a:p>
-            <a:pPr indent="-228600" lvl="0" marL="457200" rtl="0">
-              <a:spcBef>
-                <a:spcPts val="0"/>
-              </a:spcBef>
-            </a:pPr>
-            <a:r>
-              <a:rPr lang="en"/>
-              <a:t>Reuseable code</a:t>
-            </a:r>
-          </a:p>
-          <a:p>
-            <a:pPr indent="-228600" lvl="0" marL="457200" rtl="0">
-              <a:spcBef>
-                <a:spcPts val="0"/>
-              </a:spcBef>
-            </a:pPr>
-            <a:r>
-              <a:rPr lang="en"/>
-              <a:t>Mobile first development</a:t>
-            </a:r>
-          </a:p>
-          <a:p>
-            <a:pPr indent="-228600" lvl="0" marL="457200" rtl="0">
-              <a:spcBef>
-                <a:spcPts val="0"/>
-              </a:spcBef>
-            </a:pPr>
-            <a:r>
-              <a:rPr lang="en"/>
-              <a:t>Grid based system</a:t>
-            </a:r>
-          </a:p>
-          <a:p>
-            <a:pPr indent="-228600" lvl="0" marL="457200" rtl="0">
-              <a:spcBef>
-                <a:spcPts val="0"/>
-              </a:spcBef>
-            </a:pPr>
-            <a:r>
-              <a:rPr lang="en"/>
-              <a:t>Responsive</a:t>
-            </a:r>
-          </a:p>
-          <a:p>
-            <a:pPr indent="-228600" lvl="0" marL="457200" rtl="0">
-              <a:spcBef>
-                <a:spcPts val="0"/>
-              </a:spcBef>
-            </a:pPr>
-            <a:r>
-              <a:rPr lang="en"/>
-              <a:t>Built in style and alternatives</a:t>
-            </a:r>
-          </a:p>
-          <a:p>
-            <a:pPr indent="-228600" lvl="0" marL="457200" rtl="0">
-              <a:spcBef>
-                <a:spcPts val="0"/>
-              </a:spcBef>
-            </a:pPr>
-            <a:r>
-              <a:rPr lang="en"/>
-              <a:t>Easy, Fast, Free</a:t>
-            </a:r>
+              <a:t>FTP client to upload our source files to our web server. </a:t>
+            </a:r>
+          </a:p>
+          <a:p>
+            <a:pPr>
+              <a:spcBef>
+                <a:spcPts val="0"/>
+              </a:spcBef>
+              <a:buNone/>
+            </a:pPr>
+            <a:r>
+              <a:t/>
+            </a:r>
+            <a:endParaRPr/>
           </a:p>
         </p:txBody>
       </p:sp>
       <p:pic>
         <p:nvPicPr>
-          <p:cNvPr id="173" name="Shape 173"/>
+          <p:cNvPr id="170" name="Shape 170"/>
           <p:cNvPicPr preferRelativeResize="0"/>
           <p:nvPr/>
         </p:nvPicPr>
@@ -8510,8 +8720,8 @@
         </p:blipFill>
         <p:spPr>
           <a:xfrm>
-            <a:off x="4393350" y="1085100"/>
-            <a:ext cx="4438937" cy="3551149"/>
+            <a:off x="311700" y="1031875"/>
+            <a:ext cx="3537000" cy="3537000"/>
           </a:xfrm>
           <a:prstGeom prst="rect">
             <a:avLst/>
@@ -8819,7 +9029,7 @@
   <p:cSld>
     <p:spTree>
       <p:nvGrpSpPr>
-        <p:cNvPr id="177" name="Shape 177"/>
+        <p:cNvPr id="174" name="Shape 174"/>
         <p:cNvGrpSpPr/>
         <p:nvPr/>
       </p:nvGrpSpPr>
@@ -8833,7 +9043,7 @@
       </p:grpSpPr>
       <p:sp>
         <p:nvSpPr>
-          <p:cNvPr id="178" name="Shape 178"/>
+          <p:cNvPr id="175" name="Shape 175"/>
           <p:cNvSpPr txBox="1"/>
           <p:nvPr>
             <p:ph type="title"/>
@@ -8862,14 +9072,72 @@
             </a:pPr>
             <a:r>
               <a:rPr lang="en"/>
-              <a:t>Bootstrap Features</a:t>
-            </a:r>
+              <a:t>MySQL Workbench</a:t>
+            </a:r>
+          </a:p>
+        </p:txBody>
+      </p:sp>
+      <p:sp>
+        <p:nvSpPr>
+          <p:cNvPr id="176" name="Shape 176"/>
+          <p:cNvSpPr txBox="1"/>
+          <p:nvPr>
+            <p:ph idx="1" type="body"/>
+          </p:nvPr>
+        </p:nvSpPr>
+        <p:spPr>
+          <a:xfrm>
+            <a:off x="4035125" y="1152475"/>
+            <a:ext cx="4859099" cy="3596699"/>
+          </a:xfrm>
+          <a:prstGeom prst="rect">
+            <a:avLst/>
+          </a:prstGeom>
+        </p:spPr>
+        <p:txBody>
+          <a:bodyPr anchorCtr="0" anchor="t" bIns="91425" lIns="91425" rIns="91425" tIns="91425">
+            <a:noAutofit/>
+          </a:bodyPr>
+          <a:lstStyle/>
+          <a:p>
+            <a:pPr indent="-228600" lvl="0" marL="457200" rtl="0">
+              <a:spcBef>
+                <a:spcPts val="0"/>
+              </a:spcBef>
+            </a:pPr>
+            <a:r>
+              <a:rPr lang="en"/>
+              <a:t>Creating and maintaining database</a:t>
+            </a:r>
+          </a:p>
+          <a:p>
+            <a:pPr indent="-228600" lvl="0" marL="457200" rtl="0">
+              <a:spcBef>
+                <a:spcPts val="0"/>
+              </a:spcBef>
+            </a:pPr>
+            <a:r>
+              <a:rPr lang="en"/>
+              <a:t>All taxpayer information will be stored in database</a:t>
+            </a:r>
+          </a:p>
+          <a:p>
+            <a:pPr lvl="0" rtl="0">
+              <a:spcBef>
+                <a:spcPts val="0"/>
+              </a:spcBef>
+              <a:buNone/>
+            </a:pPr>
+            <a:r>
+              <a:t/>
+            </a:r>
+            <a:endParaRPr/>
           </a:p>
         </p:txBody>
       </p:sp>
       <p:pic>
         <p:nvPicPr>
-          <p:cNvPr id="179" name="Shape 179"/>
+          <p:cNvPr id="177" name="Shape 177"/>
           <p:cNvPicPr preferRelativeResize="0"/>
           <p:nvPr/>
         </p:nvPicPr>
@@ -8883,36 +9151,8 @@
         </p:blipFill>
         <p:spPr>
           <a:xfrm>
-            <a:off x="333375" y="1152475"/>
-            <a:ext cx="8477250" cy="2305050"/>
-          </a:xfrm>
-          <a:prstGeom prst="rect">
-            <a:avLst/>
-          </a:prstGeom>
-          <a:noFill/>
-          <a:ln>
-            <a:noFill/>
-          </a:ln>
-        </p:spPr>
-      </p:pic>
-      <p:pic>
-        <p:nvPicPr>
-          <p:cNvPr id="180" name="Shape 180"/>
-          <p:cNvPicPr preferRelativeResize="0"/>
-          <p:nvPr/>
-        </p:nvPicPr>
-        <p:blipFill>
-          <a:blip r:embed="rId4">
-            <a:alphaModFix/>
-          </a:blip>
-          <a:stretch>
-            <a:fillRect/>
-          </a:stretch>
-        </p:blipFill>
-        <p:spPr>
-          <a:xfrm>
-            <a:off x="623887" y="3885212"/>
-            <a:ext cx="7896225" cy="581025"/>
+            <a:off x="311700" y="1152474"/>
+            <a:ext cx="3723425" cy="3723425"/>
           </a:xfrm>
           <a:prstGeom prst="rect">
             <a:avLst/>
@@ -8939,7 +9179,7 @@
   <p:cSld>
     <p:spTree>
       <p:nvGrpSpPr>
-        <p:cNvPr id="184" name="Shape 184"/>
+        <p:cNvPr id="181" name="Shape 181"/>
         <p:cNvGrpSpPr/>
         <p:nvPr/>
       </p:nvGrpSpPr>
@@ -8953,7 +9193,7 @@
       </p:grpSpPr>
       <p:sp>
         <p:nvSpPr>
-          <p:cNvPr id="185" name="Shape 185"/>
+          <p:cNvPr id="182" name="Shape 182"/>
           <p:cNvSpPr txBox="1"/>
           <p:nvPr>
             <p:ph type="title"/>
@@ -8961,15 +9201,15 @@
         </p:nvSpPr>
         <p:spPr>
           <a:xfrm>
-            <a:off x="311700" y="445025"/>
-            <a:ext cx="8520599" cy="572699"/>
+            <a:off x="671250" y="2141250"/>
+            <a:ext cx="7852199" cy="861000"/>
           </a:xfrm>
           <a:prstGeom prst="rect">
             <a:avLst/>
           </a:prstGeom>
         </p:spPr>
         <p:txBody>
-          <a:bodyPr anchorCtr="0" anchor="t" bIns="91425" lIns="91425" rIns="91425" tIns="91425">
+          <a:bodyPr anchorCtr="0" anchor="ctr" bIns="91425" lIns="91425" rIns="91425" tIns="91425">
             <a:noAutofit/>
           </a:bodyPr>
           <a:lstStyle/>
@@ -8982,163 +9222,11 @@
             </a:pPr>
             <a:r>
               <a:rPr lang="en"/>
-              <a:t>PayPal</a:t>
+              <a:t>Referenced Materials</a:t>
             </a:r>
           </a:p>
         </p:txBody>
       </p:sp>
-      <p:sp>
-        <p:nvSpPr>
-          <p:cNvPr id="186" name="Shape 186"/>
-          <p:cNvSpPr txBox="1"/>
-          <p:nvPr>
-            <p:ph idx="1" type="body"/>
-          </p:nvPr>
-        </p:nvSpPr>
-        <p:spPr>
-          <a:xfrm>
-            <a:off x="311700" y="1152475"/>
-            <a:ext cx="4422600" cy="3416400"/>
-          </a:xfrm>
-          <a:prstGeom prst="rect">
-            <a:avLst/>
-          </a:prstGeom>
-        </p:spPr>
-        <p:txBody>
-          <a:bodyPr anchorCtr="0" anchor="t" bIns="91425" lIns="91425" rIns="91425" tIns="91425">
-            <a:noAutofit/>
-          </a:bodyPr>
-          <a:lstStyle/>
-          <a:p>
-            <a:pPr indent="-228600" lvl="0" marL="457200" rtl="0">
-              <a:spcBef>
-                <a:spcPts val="0"/>
-              </a:spcBef>
-            </a:pPr>
-            <a:r>
-              <a:rPr lang="en"/>
-              <a:t>Working with PayPal to carry out secure transactions after taxpayers complete their tax form. </a:t>
-            </a:r>
-          </a:p>
-          <a:p>
-            <a:pPr indent="-228600" lvl="0" marL="457200" rtl="0">
-              <a:spcBef>
-                <a:spcPts val="0"/>
-              </a:spcBef>
-            </a:pPr>
-            <a:r>
-              <a:rPr lang="en"/>
-              <a:t>Reusable code</a:t>
-            </a:r>
-          </a:p>
-          <a:p>
-            <a:pPr indent="-228600" lvl="0" marL="457200" rtl="0">
-              <a:spcBef>
-                <a:spcPts val="0"/>
-              </a:spcBef>
-            </a:pPr>
-            <a:r>
-              <a:rPr lang="en"/>
-              <a:t>Easily modifiable</a:t>
-            </a:r>
-          </a:p>
-          <a:p>
-            <a:pPr indent="-228600" lvl="0" marL="457200" rtl="0">
-              <a:spcBef>
-                <a:spcPts val="0"/>
-              </a:spcBef>
-            </a:pPr>
-            <a:r>
-              <a:rPr lang="en"/>
-              <a:t>Built in security</a:t>
-            </a:r>
-          </a:p>
-          <a:p>
-            <a:pPr indent="-228600" lvl="0" marL="457200" rtl="0">
-              <a:spcBef>
-                <a:spcPts val="0"/>
-              </a:spcBef>
-            </a:pPr>
-            <a:r>
-              <a:rPr lang="en"/>
-              <a:t>Payment types</a:t>
-            </a:r>
-          </a:p>
-          <a:p>
-            <a:pPr indent="-228600" lvl="1" marL="914400" rtl="0">
-              <a:spcBef>
-                <a:spcPts val="0"/>
-              </a:spcBef>
-            </a:pPr>
-            <a:r>
-              <a:rPr lang="en"/>
-              <a:t>Single</a:t>
-            </a:r>
-          </a:p>
-          <a:p>
-            <a:pPr indent="-228600" lvl="1" marL="914400" rtl="0">
-              <a:spcBef>
-                <a:spcPts val="0"/>
-              </a:spcBef>
-            </a:pPr>
-            <a:r>
-              <a:rPr lang="en"/>
-              <a:t>Installment</a:t>
-            </a:r>
-          </a:p>
-          <a:p>
-            <a:pPr indent="-228600" lvl="1" marL="914400" rtl="0">
-              <a:spcBef>
-                <a:spcPts val="0"/>
-              </a:spcBef>
-            </a:pPr>
-            <a:r>
-              <a:rPr lang="en"/>
-              <a:t>Automated</a:t>
-            </a:r>
-          </a:p>
-          <a:p>
-            <a:pPr>
-              <a:spcBef>
-                <a:spcPts val="0"/>
-              </a:spcBef>
-              <a:buNone/>
-            </a:pPr>
-            <a:r>
-              <a:t/>
-            </a:r>
-            <a:endParaRPr/>
-          </a:p>
-        </p:txBody>
-      </p:sp>
-      <p:pic>
-        <p:nvPicPr>
-          <p:cNvPr id="187" name="Shape 187"/>
-          <p:cNvPicPr preferRelativeResize="0"/>
-          <p:nvPr/>
-        </p:nvPicPr>
-        <p:blipFill>
-          <a:blip r:embed="rId3">
-            <a:alphaModFix/>
-          </a:blip>
-          <a:stretch>
-            <a:fillRect/>
-          </a:stretch>
-        </p:blipFill>
-        <p:spPr>
-          <a:xfrm>
-            <a:off x="4734149" y="1152475"/>
-            <a:ext cx="4098148" cy="3416400"/>
-          </a:xfrm>
-          <a:prstGeom prst="rect">
-            <a:avLst/>
-          </a:prstGeom>
-          <a:noFill/>
-          <a:ln>
-            <a:noFill/>
-          </a:ln>
-        </p:spPr>
-      </p:pic>
     </p:spTree>
   </p:cSld>
   <p:clrMapOvr>
@@ -9155,7 +9243,7 @@
   <p:cSld>
     <p:spTree>
       <p:nvGrpSpPr>
-        <p:cNvPr id="191" name="Shape 191"/>
+        <p:cNvPr id="186" name="Shape 186"/>
         <p:cNvGrpSpPr/>
         <p:nvPr/>
       </p:nvGrpSpPr>
@@ -9169,7 +9257,7 @@
       </p:grpSpPr>
       <p:sp>
         <p:nvSpPr>
-          <p:cNvPr id="192" name="Shape 192"/>
+          <p:cNvPr id="187" name="Shape 187"/>
           <p:cNvSpPr txBox="1"/>
           <p:nvPr>
             <p:ph type="title"/>
@@ -9198,14 +9286,115 @@
             </a:pPr>
             <a:r>
               <a:rPr lang="en"/>
-              <a:t>PayPal Features</a:t>
+              <a:t>Bootstrap</a:t>
+            </a:r>
+          </a:p>
+        </p:txBody>
+      </p:sp>
+      <p:sp>
+        <p:nvSpPr>
+          <p:cNvPr id="188" name="Shape 188"/>
+          <p:cNvSpPr txBox="1"/>
+          <p:nvPr>
+            <p:ph idx="1" type="body"/>
+          </p:nvPr>
+        </p:nvSpPr>
+        <p:spPr>
+          <a:xfrm>
+            <a:off x="311700" y="1152475"/>
+            <a:ext cx="4081499" cy="3416400"/>
+          </a:xfrm>
+          <a:prstGeom prst="rect">
+            <a:avLst/>
+          </a:prstGeom>
+        </p:spPr>
+        <p:txBody>
+          <a:bodyPr anchorCtr="0" anchor="t" bIns="91425" lIns="91425" rIns="91425" tIns="91425">
+            <a:noAutofit/>
+          </a:bodyPr>
+          <a:lstStyle/>
+          <a:p>
+            <a:pPr indent="-228600" lvl="0" marL="457200" rtl="0">
+              <a:spcBef>
+                <a:spcPts val="0"/>
+              </a:spcBef>
+            </a:pPr>
+            <a:r>
+              <a:rPr lang="en"/>
+              <a:t>Built in HTML, CSS, and JS tools</a:t>
+            </a:r>
+          </a:p>
+          <a:p>
+            <a:pPr indent="-228600" lvl="0" marL="457200" rtl="0">
+              <a:spcBef>
+                <a:spcPts val="0"/>
+              </a:spcBef>
+            </a:pPr>
+            <a:r>
+              <a:rPr lang="en"/>
+              <a:t>Reuseable code</a:t>
+            </a:r>
+          </a:p>
+          <a:p>
+            <a:pPr indent="-228600" lvl="0" marL="457200" rtl="0">
+              <a:spcBef>
+                <a:spcPts val="0"/>
+              </a:spcBef>
+            </a:pPr>
+            <a:r>
+              <a:rPr lang="en"/>
+              <a:t>Mobile first development</a:t>
+            </a:r>
+          </a:p>
+          <a:p>
+            <a:pPr indent="-228600" lvl="0" marL="457200" rtl="0">
+              <a:spcBef>
+                <a:spcPts val="0"/>
+              </a:spcBef>
+            </a:pPr>
+            <a:r>
+              <a:rPr lang="en"/>
+              <a:t>Grid based system</a:t>
+            </a:r>
+          </a:p>
+          <a:p>
+            <a:pPr indent="-228600" lvl="0" marL="457200" rtl="0">
+              <a:spcBef>
+                <a:spcPts val="0"/>
+              </a:spcBef>
+            </a:pPr>
+            <a:r>
+              <a:rPr lang="en"/>
+              <a:t>Responsive</a:t>
+            </a:r>
+          </a:p>
+          <a:p>
+            <a:pPr indent="-228600" lvl="0" marL="457200" rtl="0">
+              <a:spcBef>
+                <a:spcPts val="0"/>
+              </a:spcBef>
+            </a:pPr>
+            <a:r>
+              <a:rPr lang="en"/>
+              <a:t>Built in style and alternatives</a:t>
+            </a:r>
+          </a:p>
+          <a:p>
+            <a:pPr indent="-228600" lvl="0" marL="457200" rtl="0">
+              <a:spcBef>
+                <a:spcPts val="0"/>
+              </a:spcBef>
+            </a:pPr>
+            <a:r>
+              <a:rPr lang="en"/>
+              <a:t>Easy, Fast, Free</a:t>
             </a:r>
           </a:p>
         </p:txBody>
       </p:sp>
       <p:pic>
         <p:nvPicPr>
-          <p:cNvPr id="193" name="Shape 193"/>
+          <p:cNvPr id="189" name="Shape 189"/>
           <p:cNvPicPr preferRelativeResize="0"/>
           <p:nvPr/>
         </p:nvPicPr>
@@ -9219,36 +9408,8 @@
         </p:blipFill>
         <p:spPr>
           <a:xfrm>
-            <a:off x="1604962" y="1152475"/>
-            <a:ext cx="5934075" cy="1504950"/>
-          </a:xfrm>
-          <a:prstGeom prst="rect">
-            <a:avLst/>
-          </a:prstGeom>
-          <a:noFill/>
-          <a:ln>
-            <a:noFill/>
-          </a:ln>
-        </p:spPr>
-      </p:pic>
-      <p:pic>
-        <p:nvPicPr>
-          <p:cNvPr id="194" name="Shape 194"/>
-          <p:cNvPicPr preferRelativeResize="0"/>
-          <p:nvPr/>
-        </p:nvPicPr>
-        <p:blipFill>
-          <a:blip r:embed="rId4">
-            <a:alphaModFix/>
-          </a:blip>
-          <a:stretch>
-            <a:fillRect/>
-          </a:stretch>
-        </p:blipFill>
-        <p:spPr>
-          <a:xfrm>
-            <a:off x="3952862" y="3035337"/>
-            <a:ext cx="1238250" cy="1533525"/>
+            <a:off x="4393350" y="1085100"/>
+            <a:ext cx="4438937" cy="3551149"/>
           </a:xfrm>
           <a:prstGeom prst="rect">
             <a:avLst/>
@@ -9275,7 +9436,7 @@
   <p:cSld>
     <p:spTree>
       <p:nvGrpSpPr>
-        <p:cNvPr id="198" name="Shape 198"/>
+        <p:cNvPr id="193" name="Shape 193"/>
         <p:cNvGrpSpPr/>
         <p:nvPr/>
       </p:nvGrpSpPr>
@@ -9289,7 +9450,7 @@
       </p:grpSpPr>
       <p:sp>
         <p:nvSpPr>
-          <p:cNvPr id="199" name="Shape 199"/>
+          <p:cNvPr id="194" name="Shape 194"/>
           <p:cNvSpPr txBox="1"/>
           <p:nvPr>
             <p:ph type="title"/>
@@ -9297,15 +9458,15 @@
         </p:nvSpPr>
         <p:spPr>
           <a:xfrm>
-            <a:off x="671250" y="2141250"/>
-            <a:ext cx="7852199" cy="861000"/>
+            <a:off x="311700" y="445025"/>
+            <a:ext cx="8520599" cy="572699"/>
           </a:xfrm>
           <a:prstGeom prst="rect">
             <a:avLst/>
           </a:prstGeom>
         </p:spPr>
         <p:txBody>
-          <a:bodyPr anchorCtr="0" anchor="ctr" bIns="91425" lIns="91425" rIns="91425" tIns="91425">
+          <a:bodyPr anchorCtr="0" anchor="t" bIns="91425" lIns="91425" rIns="91425" tIns="91425">
             <a:noAutofit/>
           </a:bodyPr>
           <a:lstStyle/>
@@ -9318,11 +9479,67 @@
             </a:pPr>
             <a:r>
               <a:rPr lang="en"/>
-              <a:t>Current State</a:t>
+              <a:t>Bootstrap Features</a:t>
             </a:r>
           </a:p>
         </p:txBody>
       </p:sp>
+      <p:pic>
+        <p:nvPicPr>
+          <p:cNvPr id="195" name="Shape 195"/>
+          <p:cNvPicPr preferRelativeResize="0"/>
+          <p:nvPr/>
+        </p:nvPicPr>
+        <p:blipFill>
+          <a:blip r:embed="rId3">
+            <a:alphaModFix/>
+          </a:blip>
+          <a:stretch>
+            <a:fillRect/>
+          </a:stretch>
+        </p:blipFill>
+        <p:spPr>
+          <a:xfrm>
+            <a:off x="333375" y="1152475"/>
+            <a:ext cx="8477250" cy="2305050"/>
+          </a:xfrm>
+          <a:prstGeom prst="rect">
+            <a:avLst/>
+          </a:prstGeom>
+          <a:noFill/>
+          <a:ln>
+            <a:noFill/>
+          </a:ln>
+        </p:spPr>
+      </p:pic>
+      <p:pic>
+        <p:nvPicPr>
+          <p:cNvPr id="196" name="Shape 196"/>
+          <p:cNvPicPr preferRelativeResize="0"/>
+          <p:nvPr/>
+        </p:nvPicPr>
+        <p:blipFill>
+          <a:blip r:embed="rId4">
+            <a:alphaModFix/>
+          </a:blip>
+          <a:stretch>
+            <a:fillRect/>
+          </a:stretch>
+        </p:blipFill>
+        <p:spPr>
+          <a:xfrm>
+            <a:off x="623887" y="3885212"/>
+            <a:ext cx="7896225" cy="581025"/>
+          </a:xfrm>
+          <a:prstGeom prst="rect">
+            <a:avLst/>
+          </a:prstGeom>
+          <a:noFill/>
+          <a:ln>
+            <a:noFill/>
+          </a:ln>
+        </p:spPr>
+      </p:pic>
     </p:spTree>
   </p:cSld>
   <p:clrMapOvr>
@@ -9339,7 +9556,7 @@
   <p:cSld>
     <p:spTree>
       <p:nvGrpSpPr>
-        <p:cNvPr id="203" name="Shape 203"/>
+        <p:cNvPr id="200" name="Shape 200"/>
         <p:cNvGrpSpPr/>
         <p:nvPr/>
       </p:nvGrpSpPr>
@@ -9353,7 +9570,7 @@
       </p:grpSpPr>
       <p:sp>
         <p:nvSpPr>
-          <p:cNvPr id="204" name="Shape 204"/>
+          <p:cNvPr id="201" name="Shape 201"/>
           <p:cNvSpPr txBox="1"/>
           <p:nvPr>
             <p:ph type="title"/>
@@ -9382,14 +9599,138 @@
             </a:pPr>
             <a:r>
               <a:rPr lang="en"/>
-              <a:t>Sign Up / Log In</a:t>
-            </a:r>
+              <a:t>PayPal</a:t>
+            </a:r>
+          </a:p>
+        </p:txBody>
+      </p:sp>
+      <p:sp>
+        <p:nvSpPr>
+          <p:cNvPr id="202" name="Shape 202"/>
+          <p:cNvSpPr txBox="1"/>
+          <p:nvPr>
+            <p:ph idx="1" type="body"/>
+          </p:nvPr>
+        </p:nvSpPr>
+        <p:spPr>
+          <a:xfrm>
+            <a:off x="311700" y="1152475"/>
+            <a:ext cx="4422600" cy="3416400"/>
+          </a:xfrm>
+          <a:prstGeom prst="rect">
+            <a:avLst/>
+          </a:prstGeom>
+        </p:spPr>
+        <p:txBody>
+          <a:bodyPr anchorCtr="0" anchor="t" bIns="91425" lIns="91425" rIns="91425" tIns="91425">
+            <a:noAutofit/>
+          </a:bodyPr>
+          <a:lstStyle/>
+          <a:p>
+            <a:pPr indent="-228600" lvl="0" marL="457200" rtl="0">
+              <a:spcBef>
+                <a:spcPts val="0"/>
+              </a:spcBef>
+            </a:pPr>
+            <a:r>
+              <a:rPr lang="en"/>
+              <a:t>Working with PayPal to carry out secure transactions after taxpayers complete their tax form. </a:t>
+            </a:r>
+          </a:p>
+          <a:p>
+            <a:pPr indent="-228600" lvl="0" marL="457200" rtl="0">
+              <a:spcBef>
+                <a:spcPts val="0"/>
+              </a:spcBef>
+            </a:pPr>
+            <a:r>
+              <a:rPr lang="en"/>
+              <a:t>Reusable code</a:t>
+            </a:r>
+          </a:p>
+          <a:p>
+            <a:pPr indent="-228600" lvl="0" marL="457200" rtl="0">
+              <a:spcBef>
+                <a:spcPts val="0"/>
+              </a:spcBef>
+            </a:pPr>
+            <a:r>
+              <a:rPr lang="en"/>
+              <a:t>Easily modifiable</a:t>
+            </a:r>
+          </a:p>
+          <a:p>
+            <a:pPr indent="-228600" lvl="0" marL="457200" rtl="0">
+              <a:spcBef>
+                <a:spcPts val="0"/>
+              </a:spcBef>
+            </a:pPr>
+            <a:r>
+              <a:rPr lang="en"/>
+              <a:t>Built in security</a:t>
+            </a:r>
+          </a:p>
+          <a:p>
+            <a:pPr indent="-228600" lvl="0" marL="457200" rtl="0">
+              <a:spcBef>
+                <a:spcPts val="0"/>
+              </a:spcBef>
+            </a:pPr>
+            <a:r>
+              <a:rPr lang="en"/>
+              <a:t>Payment types</a:t>
+            </a:r>
+          </a:p>
+          <a:p>
+            <a:pPr indent="-228600" lvl="1" marL="914400" rtl="0">
+              <a:spcBef>
+                <a:spcPts val="0"/>
+              </a:spcBef>
+            </a:pPr>
+            <a:r>
+              <a:rPr lang="en"/>
+              <a:t>Single</a:t>
+            </a:r>
+          </a:p>
+          <a:p>
+            <a:pPr indent="-228600" lvl="1" marL="914400" rtl="0">
+              <a:spcBef>
+                <a:spcPts val="0"/>
+              </a:spcBef>
+            </a:pPr>
+            <a:r>
+              <a:rPr lang="en"/>
+              <a:t>Installment</a:t>
+            </a:r>
+          </a:p>
+          <a:p>
+            <a:pPr indent="-228600" lvl="1" marL="914400" rtl="0">
+              <a:spcBef>
+                <a:spcPts val="0"/>
+              </a:spcBef>
+            </a:pPr>
+            <a:r>
+              <a:rPr lang="en"/>
+              <a:t>Automated</a:t>
+            </a:r>
+          </a:p>
+          <a:p>
+            <a:pPr>
+              <a:spcBef>
+                <a:spcPts val="0"/>
+              </a:spcBef>
+              <a:buNone/>
+            </a:pPr>
+            <a:r>
+              <a:t/>
+            </a:r>
+            <a:endParaRPr/>
           </a:p>
         </p:txBody>
       </p:sp>
       <p:pic>
         <p:nvPicPr>
-          <p:cNvPr id="205" name="Shape 205"/>
+          <p:cNvPr id="203" name="Shape 203"/>
           <p:cNvPicPr preferRelativeResize="0"/>
           <p:nvPr/>
         </p:nvPicPr>
@@ -9403,8 +9744,8 @@
         </p:blipFill>
         <p:spPr>
           <a:xfrm>
-            <a:off x="1001275" y="1017725"/>
-            <a:ext cx="7141447" cy="4017075"/>
+            <a:off x="4734149" y="1152475"/>
+            <a:ext cx="4098148" cy="3416400"/>
           </a:xfrm>
           <a:prstGeom prst="rect">
             <a:avLst/>
@@ -9431,7 +9772,7 @@
   <p:cSld>
     <p:spTree>
       <p:nvGrpSpPr>
-        <p:cNvPr id="209" name="Shape 209"/>
+        <p:cNvPr id="207" name="Shape 207"/>
         <p:cNvGrpSpPr/>
         <p:nvPr/>
       </p:nvGrpSpPr>
@@ -9445,7 +9786,7 @@
       </p:grpSpPr>
       <p:sp>
         <p:nvSpPr>
-          <p:cNvPr id="210" name="Shape 210"/>
+          <p:cNvPr id="208" name="Shape 208"/>
           <p:cNvSpPr txBox="1"/>
           <p:nvPr>
             <p:ph type="title"/>
@@ -9453,15 +9794,15 @@
         </p:nvSpPr>
         <p:spPr>
           <a:xfrm>
-            <a:off x="671250" y="2141250"/>
-            <a:ext cx="7852199" cy="861000"/>
+            <a:off x="311700" y="445025"/>
+            <a:ext cx="8520599" cy="572699"/>
           </a:xfrm>
           <a:prstGeom prst="rect">
             <a:avLst/>
           </a:prstGeom>
         </p:spPr>
         <p:txBody>
-          <a:bodyPr anchorCtr="0" anchor="ctr" bIns="91425" lIns="91425" rIns="91425" tIns="91425">
+          <a:bodyPr anchorCtr="0" anchor="t" bIns="91425" lIns="91425" rIns="91425" tIns="91425">
             <a:noAutofit/>
           </a:bodyPr>
           <a:lstStyle/>
@@ -9474,11 +9815,67 @@
             </a:pPr>
             <a:r>
               <a:rPr lang="en"/>
-              <a:t>What’s Next?</a:t>
+              <a:t>PayPal Features</a:t>
             </a:r>
           </a:p>
         </p:txBody>
       </p:sp>
+      <p:pic>
+        <p:nvPicPr>
+          <p:cNvPr id="209" name="Shape 209"/>
+          <p:cNvPicPr preferRelativeResize="0"/>
+          <p:nvPr/>
+        </p:nvPicPr>
+        <p:blipFill>
+          <a:blip r:embed="rId3">
+            <a:alphaModFix/>
+          </a:blip>
+          <a:stretch>
+            <a:fillRect/>
+          </a:stretch>
+        </p:blipFill>
+        <p:spPr>
+          <a:xfrm>
+            <a:off x="1604962" y="1152475"/>
+            <a:ext cx="5934075" cy="1504950"/>
+          </a:xfrm>
+          <a:prstGeom prst="rect">
+            <a:avLst/>
+          </a:prstGeom>
+          <a:noFill/>
+          <a:ln>
+            <a:noFill/>
+          </a:ln>
+        </p:spPr>
+      </p:pic>
+      <p:pic>
+        <p:nvPicPr>
+          <p:cNvPr id="210" name="Shape 210"/>
+          <p:cNvPicPr preferRelativeResize="0"/>
+          <p:nvPr/>
+        </p:nvPicPr>
+        <p:blipFill>
+          <a:blip r:embed="rId4">
+            <a:alphaModFix/>
+          </a:blip>
+          <a:stretch>
+            <a:fillRect/>
+          </a:stretch>
+        </p:blipFill>
+        <p:spPr>
+          <a:xfrm>
+            <a:off x="3952862" y="3035337"/>
+            <a:ext cx="1238250" cy="1533525"/>
+          </a:xfrm>
+          <a:prstGeom prst="rect">
+            <a:avLst/>
+          </a:prstGeom>
+          <a:noFill/>
+          <a:ln>
+            <a:noFill/>
+          </a:ln>
+        </p:spPr>
+      </p:pic>
     </p:spTree>
   </p:cSld>
   <p:clrMapOvr>
@@ -9517,15 +9914,15 @@
         </p:nvSpPr>
         <p:spPr>
           <a:xfrm>
-            <a:off x="311700" y="445025"/>
-            <a:ext cx="8520599" cy="572699"/>
+            <a:off x="671250" y="2141250"/>
+            <a:ext cx="7852199" cy="861000"/>
           </a:xfrm>
           <a:prstGeom prst="rect">
             <a:avLst/>
           </a:prstGeom>
         </p:spPr>
         <p:txBody>
-          <a:bodyPr anchorCtr="0" anchor="t" bIns="91425" lIns="91425" rIns="91425" tIns="91425">
+          <a:bodyPr anchorCtr="0" anchor="ctr" bIns="91425" lIns="91425" rIns="91425" tIns="91425">
             <a:noAutofit/>
           </a:bodyPr>
           <a:lstStyle/>
@@ -9538,130 +9935,7 @@
             </a:pPr>
             <a:r>
               <a:rPr lang="en"/>
-              <a:t>Steps to complete </a:t>
-            </a:r>
-          </a:p>
-        </p:txBody>
-      </p:sp>
-      <p:sp>
-        <p:nvSpPr>
-          <p:cNvPr id="216" name="Shape 216"/>
-          <p:cNvSpPr txBox="1"/>
-          <p:nvPr>
-            <p:ph idx="1" type="body"/>
-          </p:nvPr>
-        </p:nvSpPr>
-        <p:spPr>
-          <a:xfrm>
-            <a:off x="311700" y="1152475"/>
-            <a:ext cx="8520599" cy="3416400"/>
-          </a:xfrm>
-          <a:prstGeom prst="rect">
-            <a:avLst/>
-          </a:prstGeom>
-        </p:spPr>
-        <p:txBody>
-          <a:bodyPr anchorCtr="0" anchor="t" bIns="91425" lIns="91425" rIns="91425" tIns="91425">
-            <a:noAutofit/>
-          </a:bodyPr>
-          <a:lstStyle/>
-          <a:p>
-            <a:pPr indent="-228600" lvl="0" marL="457200" rtl="0">
-              <a:spcBef>
-                <a:spcPts val="0"/>
-              </a:spcBef>
-            </a:pPr>
-            <a:r>
-              <a:rPr lang="en"/>
-              <a:t>Gather requirements (Ongoing process)</a:t>
-            </a:r>
-          </a:p>
-          <a:p>
-            <a:pPr indent="-228600" lvl="0" marL="457200" rtl="0">
-              <a:spcBef>
-                <a:spcPts val="0"/>
-              </a:spcBef>
-            </a:pPr>
-            <a:r>
-              <a:rPr lang="en"/>
-              <a:t>Consult with client (Ongoing process)</a:t>
-            </a:r>
-          </a:p>
-          <a:p>
-            <a:pPr indent="-228600" lvl="0" marL="457200" rtl="0">
-              <a:spcBef>
-                <a:spcPts val="0"/>
-              </a:spcBef>
-            </a:pPr>
-            <a:r>
-              <a:rPr lang="en"/>
-              <a:t>Setup code repository (Completed)</a:t>
-            </a:r>
-          </a:p>
-          <a:p>
-            <a:pPr indent="-228600" lvl="0" marL="457200" rtl="0">
-              <a:spcBef>
-                <a:spcPts val="0"/>
-              </a:spcBef>
-            </a:pPr>
-            <a:r>
-              <a:rPr lang="en"/>
-              <a:t>Design Website interface (Finishing)</a:t>
-            </a:r>
-          </a:p>
-          <a:p>
-            <a:pPr indent="-228600" lvl="0" marL="457200" rtl="0">
-              <a:spcBef>
-                <a:spcPts val="0"/>
-              </a:spcBef>
-            </a:pPr>
-            <a:r>
-              <a:rPr lang="en"/>
-              <a:t>Configure Database tables (Being worked on)</a:t>
-            </a:r>
-          </a:p>
-          <a:p>
-            <a:pPr indent="-228600" lvl="0" marL="457200" rtl="0">
-              <a:spcBef>
-                <a:spcPts val="0"/>
-              </a:spcBef>
-            </a:pPr>
-            <a:r>
-              <a:rPr lang="en"/>
-              <a:t>Code front facing site using JavaScript (Being worked on)</a:t>
-            </a:r>
-          </a:p>
-          <a:p>
-            <a:pPr indent="-228600" lvl="0" marL="457200" rtl="0">
-              <a:spcBef>
-                <a:spcPts val="0"/>
-              </a:spcBef>
-            </a:pPr>
-            <a:r>
-              <a:rPr lang="en"/>
-              <a:t>Code server side using PHP (Being worked on)</a:t>
-            </a:r>
-          </a:p>
-          <a:p>
-            <a:pPr indent="-228600" lvl="0" marL="457200" rtl="0">
-              <a:spcBef>
-                <a:spcPts val="0"/>
-              </a:spcBef>
-            </a:pPr>
-            <a:r>
-              <a:rPr lang="en"/>
-              <a:t>Use Bootstrap to style (Needs completion of earlier tasks)</a:t>
-            </a:r>
-          </a:p>
-          <a:p>
-            <a:pPr indent="-228600" lvl="0" marL="457200" rtl="0">
-              <a:spcBef>
-                <a:spcPts val="0"/>
-              </a:spcBef>
-            </a:pPr>
-            <a:r>
-              <a:rPr lang="en"/>
-              <a:t>Test, loop back to review/change any section of the development (Continuously being done) </a:t>
+              <a:t>Current State</a:t>
             </a:r>
           </a:p>
         </p:txBody>
@@ -9682,7 +9956,7 @@
   <p:cSld>
     <p:spTree>
       <p:nvGrpSpPr>
-        <p:cNvPr id="220" name="Shape 220"/>
+        <p:cNvPr id="219" name="Shape 219"/>
         <p:cNvGrpSpPr/>
         <p:nvPr/>
       </p:nvGrpSpPr>
@@ -9696,7 +9970,7 @@
       </p:grpSpPr>
       <p:sp>
         <p:nvSpPr>
-          <p:cNvPr id="221" name="Shape 221"/>
+          <p:cNvPr id="220" name="Shape 220"/>
           <p:cNvSpPr txBox="1"/>
           <p:nvPr>
             <p:ph type="title"/>
@@ -9725,14 +9999,14 @@
             </a:pPr>
             <a:r>
               <a:rPr lang="en"/>
-              <a:t>Result : A Satisfied Customer</a:t>
+              <a:t>Sign Up / Log In</a:t>
             </a:r>
           </a:p>
         </p:txBody>
       </p:sp>
       <p:pic>
         <p:nvPicPr>
-          <p:cNvPr id="222" name="Shape 222"/>
+          <p:cNvPr id="221" name="Shape 221"/>
           <p:cNvPicPr preferRelativeResize="0"/>
           <p:nvPr/>
         </p:nvPicPr>
@@ -9746,8 +10020,8 @@
         </p:blipFill>
         <p:spPr>
           <a:xfrm>
-            <a:off x="1920700" y="1152475"/>
-            <a:ext cx="5066249" cy="3797425"/>
+            <a:off x="1001275" y="1017725"/>
+            <a:ext cx="7141447" cy="4017075"/>
           </a:xfrm>
           <a:prstGeom prst="rect">
             <a:avLst/>
@@ -9758,6 +10032,257 @@
           </a:ln>
         </p:spPr>
       </p:pic>
+    </p:spTree>
+  </p:cSld>
+  <p:clrMapOvr>
+    <a:masterClrMapping/>
+  </p:clrMapOvr>
+  <p:transition spd="slow">
+    <p:cut/>
+  </p:transition>
+</p:sld>
+</file>
+
+<file path=ppt/slides/slide28.xml><?xml version="1.0" encoding="utf-8"?>
+<p:sld xmlns:a="http://schemas.openxmlformats.org/drawingml/2006/main" xmlns:r="http://schemas.openxmlformats.org/officeDocument/2006/relationships" xmlns:mc="http://schemas.openxmlformats.org/markup-compatibility/2006" xmlns:mv="urn:schemas-microsoft-com:mac:vml" xmlns:p="http://schemas.openxmlformats.org/presentationml/2006/main" xmlns:c="http://schemas.openxmlformats.org/drawingml/2006/chart" xmlns:dgm="http://schemas.openxmlformats.org/drawingml/2006/diagram" xmlns:o="urn:schemas-microsoft-com:office:office" xmlns:v="urn:schemas-microsoft-com:vml" xmlns:pvml="urn:schemas-microsoft-com:office:powerpoint" xmlns:com="http://schemas.openxmlformats.org/drawingml/2006/compatibility" xmlns:p14="http://schemas.microsoft.com/office/powerpoint/2010/main">
+  <p:cSld>
+    <p:spTree>
+      <p:nvGrpSpPr>
+        <p:cNvPr id="225" name="Shape 225"/>
+        <p:cNvGrpSpPr/>
+        <p:nvPr/>
+      </p:nvGrpSpPr>
+      <p:grpSpPr>
+        <a:xfrm>
+          <a:off x="0" y="0"/>
+          <a:ext cx="0" cy="0"/>
+          <a:chOff x="0" y="0"/>
+          <a:chExt cx="0" cy="0"/>
+        </a:xfrm>
+      </p:grpSpPr>
+      <p:sp>
+        <p:nvSpPr>
+          <p:cNvPr id="226" name="Shape 226"/>
+          <p:cNvSpPr txBox="1"/>
+          <p:nvPr>
+            <p:ph type="title"/>
+          </p:nvPr>
+        </p:nvSpPr>
+        <p:spPr>
+          <a:xfrm>
+            <a:off x="671250" y="2141250"/>
+            <a:ext cx="7852199" cy="861000"/>
+          </a:xfrm>
+          <a:prstGeom prst="rect">
+            <a:avLst/>
+          </a:prstGeom>
+        </p:spPr>
+        <p:txBody>
+          <a:bodyPr anchorCtr="0" anchor="ctr" bIns="91425" lIns="91425" rIns="91425" tIns="91425">
+            <a:noAutofit/>
+          </a:bodyPr>
+          <a:lstStyle/>
+          <a:p>
+            <a:pPr>
+              <a:spcBef>
+                <a:spcPts val="0"/>
+              </a:spcBef>
+              <a:buNone/>
+            </a:pPr>
+            <a:r>
+              <a:rPr lang="en"/>
+              <a:t>What’s Next?</a:t>
+            </a:r>
+          </a:p>
+        </p:txBody>
+      </p:sp>
+    </p:spTree>
+  </p:cSld>
+  <p:clrMapOvr>
+    <a:masterClrMapping/>
+  </p:clrMapOvr>
+  <p:transition spd="slow">
+    <p:cut/>
+  </p:transition>
+</p:sld>
+</file>
+
+<file path=ppt/slides/slide29.xml><?xml version="1.0" encoding="utf-8"?>
+<p:sld xmlns:a="http://schemas.openxmlformats.org/drawingml/2006/main" xmlns:r="http://schemas.openxmlformats.org/officeDocument/2006/relationships" xmlns:mc="http://schemas.openxmlformats.org/markup-compatibility/2006" xmlns:mv="urn:schemas-microsoft-com:mac:vml" xmlns:p="http://schemas.openxmlformats.org/presentationml/2006/main" xmlns:c="http://schemas.openxmlformats.org/drawingml/2006/chart" xmlns:dgm="http://schemas.openxmlformats.org/drawingml/2006/diagram" xmlns:o="urn:schemas-microsoft-com:office:office" xmlns:v="urn:schemas-microsoft-com:vml" xmlns:pvml="urn:schemas-microsoft-com:office:powerpoint" xmlns:com="http://schemas.openxmlformats.org/drawingml/2006/compatibility" xmlns:p14="http://schemas.microsoft.com/office/powerpoint/2010/main">
+  <p:cSld>
+    <p:spTree>
+      <p:nvGrpSpPr>
+        <p:cNvPr id="230" name="Shape 230"/>
+        <p:cNvGrpSpPr/>
+        <p:nvPr/>
+      </p:nvGrpSpPr>
+      <p:grpSpPr>
+        <a:xfrm>
+          <a:off x="0" y="0"/>
+          <a:ext cx="0" cy="0"/>
+          <a:chOff x="0" y="0"/>
+          <a:chExt cx="0" cy="0"/>
+        </a:xfrm>
+      </p:grpSpPr>
+      <p:sp>
+        <p:nvSpPr>
+          <p:cNvPr id="231" name="Shape 231"/>
+          <p:cNvSpPr txBox="1"/>
+          <p:nvPr>
+            <p:ph type="title"/>
+          </p:nvPr>
+        </p:nvSpPr>
+        <p:spPr>
+          <a:xfrm>
+            <a:off x="311700" y="445025"/>
+            <a:ext cx="8520599" cy="572699"/>
+          </a:xfrm>
+          <a:prstGeom prst="rect">
+            <a:avLst/>
+          </a:prstGeom>
+        </p:spPr>
+        <p:txBody>
+          <a:bodyPr anchorCtr="0" anchor="t" bIns="91425" lIns="91425" rIns="91425" tIns="91425">
+            <a:noAutofit/>
+          </a:bodyPr>
+          <a:lstStyle/>
+          <a:p>
+            <a:pPr>
+              <a:spcBef>
+                <a:spcPts val="0"/>
+              </a:spcBef>
+              <a:buNone/>
+            </a:pPr>
+            <a:r>
+              <a:rPr lang="en"/>
+              <a:t>Steps to complete </a:t>
+            </a:r>
+          </a:p>
+        </p:txBody>
+      </p:sp>
+      <p:sp>
+        <p:nvSpPr>
+          <p:cNvPr id="232" name="Shape 232"/>
+          <p:cNvSpPr txBox="1"/>
+          <p:nvPr>
+            <p:ph idx="1" type="body"/>
+          </p:nvPr>
+        </p:nvSpPr>
+        <p:spPr>
+          <a:xfrm>
+            <a:off x="311700" y="1152475"/>
+            <a:ext cx="8520599" cy="3416400"/>
+          </a:xfrm>
+          <a:prstGeom prst="rect">
+            <a:avLst/>
+          </a:prstGeom>
+        </p:spPr>
+        <p:txBody>
+          <a:bodyPr anchorCtr="0" anchor="t" bIns="91425" lIns="91425" rIns="91425" tIns="91425">
+            <a:noAutofit/>
+          </a:bodyPr>
+          <a:lstStyle/>
+          <a:p>
+            <a:pPr indent="-228600" lvl="0" marL="457200" rtl="0">
+              <a:spcBef>
+                <a:spcPts val="0"/>
+              </a:spcBef>
+            </a:pPr>
+            <a:r>
+              <a:rPr lang="en"/>
+              <a:t>Gather requirements (Ongoing process)</a:t>
+            </a:r>
+          </a:p>
+          <a:p>
+            <a:pPr indent="-228600" lvl="0" marL="457200" rtl="0">
+              <a:spcBef>
+                <a:spcPts val="0"/>
+              </a:spcBef>
+            </a:pPr>
+            <a:r>
+              <a:rPr lang="en"/>
+              <a:t>Consult with client (Ongoing process)</a:t>
+            </a:r>
+          </a:p>
+          <a:p>
+            <a:pPr indent="-228600" lvl="0" marL="457200" rtl="0">
+              <a:spcBef>
+                <a:spcPts val="0"/>
+              </a:spcBef>
+            </a:pPr>
+            <a:r>
+              <a:rPr lang="en"/>
+              <a:t>Setup code repository (Completed)</a:t>
+            </a:r>
+          </a:p>
+          <a:p>
+            <a:pPr indent="-228600" lvl="0" marL="457200" rtl="0">
+              <a:spcBef>
+                <a:spcPts val="0"/>
+              </a:spcBef>
+            </a:pPr>
+            <a:r>
+              <a:rPr lang="en"/>
+              <a:t>Design Website interface (Finishing)</a:t>
+            </a:r>
+          </a:p>
+          <a:p>
+            <a:pPr indent="-228600" lvl="0" marL="457200" rtl="0">
+              <a:spcBef>
+                <a:spcPts val="0"/>
+              </a:spcBef>
+            </a:pPr>
+            <a:r>
+              <a:rPr lang="en"/>
+              <a:t>Configure Database tables (Being worked on)</a:t>
+            </a:r>
+          </a:p>
+          <a:p>
+            <a:pPr indent="-228600" lvl="0" marL="457200" rtl="0">
+              <a:spcBef>
+                <a:spcPts val="0"/>
+              </a:spcBef>
+            </a:pPr>
+            <a:r>
+              <a:rPr lang="en"/>
+              <a:t>Code front facing site using JavaScript (Being worked on)</a:t>
+            </a:r>
+          </a:p>
+          <a:p>
+            <a:pPr indent="-228600" lvl="0" marL="457200" rtl="0">
+              <a:spcBef>
+                <a:spcPts val="0"/>
+              </a:spcBef>
+            </a:pPr>
+            <a:r>
+              <a:rPr lang="en"/>
+              <a:t>Code server side using PHP (Being worked on)</a:t>
+            </a:r>
+          </a:p>
+          <a:p>
+            <a:pPr indent="-228600" lvl="0" marL="457200" rtl="0">
+              <a:spcBef>
+                <a:spcPts val="0"/>
+              </a:spcBef>
+            </a:pPr>
+            <a:r>
+              <a:rPr lang="en"/>
+              <a:t>Use Bootstrap to style (Needs completion of earlier tasks)</a:t>
+            </a:r>
+          </a:p>
+          <a:p>
+            <a:pPr indent="-228600" lvl="0" marL="457200" rtl="0">
+              <a:spcBef>
+                <a:spcPts val="0"/>
+              </a:spcBef>
+            </a:pPr>
+            <a:r>
+              <a:rPr lang="en"/>
+              <a:t>Test, loop back to review/change any section of the development (Continuously being done) </a:t>
+            </a:r>
+          </a:p>
+        </p:txBody>
+      </p:sp>
     </p:spTree>
   </p:cSld>
   <p:clrMapOvr>
@@ -10049,6 +10574,98 @@
 </p:sld>
 </file>
 
+<file path=ppt/slides/slide30.xml><?xml version="1.0" encoding="utf-8"?>
+<p:sld xmlns:a="http://schemas.openxmlformats.org/drawingml/2006/main" xmlns:r="http://schemas.openxmlformats.org/officeDocument/2006/relationships" xmlns:mc="http://schemas.openxmlformats.org/markup-compatibility/2006" xmlns:mv="urn:schemas-microsoft-com:mac:vml" xmlns:p="http://schemas.openxmlformats.org/presentationml/2006/main" xmlns:c="http://schemas.openxmlformats.org/drawingml/2006/chart" xmlns:dgm="http://schemas.openxmlformats.org/drawingml/2006/diagram" xmlns:o="urn:schemas-microsoft-com:office:office" xmlns:v="urn:schemas-microsoft-com:vml" xmlns:pvml="urn:schemas-microsoft-com:office:powerpoint" xmlns:com="http://schemas.openxmlformats.org/drawingml/2006/compatibility" xmlns:p14="http://schemas.microsoft.com/office/powerpoint/2010/main">
+  <p:cSld>
+    <p:spTree>
+      <p:nvGrpSpPr>
+        <p:cNvPr id="236" name="Shape 236"/>
+        <p:cNvGrpSpPr/>
+        <p:nvPr/>
+      </p:nvGrpSpPr>
+      <p:grpSpPr>
+        <a:xfrm>
+          <a:off x="0" y="0"/>
+          <a:ext cx="0" cy="0"/>
+          <a:chOff x="0" y="0"/>
+          <a:chExt cx="0" cy="0"/>
+        </a:xfrm>
+      </p:grpSpPr>
+      <p:sp>
+        <p:nvSpPr>
+          <p:cNvPr id="237" name="Shape 237"/>
+          <p:cNvSpPr txBox="1"/>
+          <p:nvPr>
+            <p:ph type="title"/>
+          </p:nvPr>
+        </p:nvSpPr>
+        <p:spPr>
+          <a:xfrm>
+            <a:off x="311700" y="445025"/>
+            <a:ext cx="8520599" cy="572699"/>
+          </a:xfrm>
+          <a:prstGeom prst="rect">
+            <a:avLst/>
+          </a:prstGeom>
+        </p:spPr>
+        <p:txBody>
+          <a:bodyPr anchorCtr="0" anchor="t" bIns="91425" lIns="91425" rIns="91425" tIns="91425">
+            <a:noAutofit/>
+          </a:bodyPr>
+          <a:lstStyle/>
+          <a:p>
+            <a:pPr>
+              <a:spcBef>
+                <a:spcPts val="0"/>
+              </a:spcBef>
+              <a:buNone/>
+            </a:pPr>
+            <a:r>
+              <a:rPr lang="en"/>
+              <a:t>Result : A Satisfied Customer</a:t>
+            </a:r>
+          </a:p>
+        </p:txBody>
+      </p:sp>
+      <p:pic>
+        <p:nvPicPr>
+          <p:cNvPr id="238" name="Shape 238"/>
+          <p:cNvPicPr preferRelativeResize="0"/>
+          <p:nvPr/>
+        </p:nvPicPr>
+        <p:blipFill>
+          <a:blip r:embed="rId3">
+            <a:alphaModFix/>
+          </a:blip>
+          <a:stretch>
+            <a:fillRect/>
+          </a:stretch>
+        </p:blipFill>
+        <p:spPr>
+          <a:xfrm>
+            <a:off x="1920700" y="1152475"/>
+            <a:ext cx="5066249" cy="3797425"/>
+          </a:xfrm>
+          <a:prstGeom prst="rect">
+            <a:avLst/>
+          </a:prstGeom>
+          <a:noFill/>
+          <a:ln>
+            <a:noFill/>
+          </a:ln>
+        </p:spPr>
+      </p:pic>
+    </p:spTree>
+  </p:cSld>
+  <p:clrMapOvr>
+    <a:masterClrMapping/>
+  </p:clrMapOvr>
+  <p:transition spd="slow">
+    <p:cut/>
+  </p:transition>
+</p:sld>
+</file>
+
 <file path=ppt/slides/slide4.xml><?xml version="1.0" encoding="utf-8"?>
 <p:sld xmlns:a="http://schemas.openxmlformats.org/drawingml/2006/main" xmlns:r="http://schemas.openxmlformats.org/officeDocument/2006/relationships" xmlns:mc="http://schemas.openxmlformats.org/markup-compatibility/2006" xmlns:mv="urn:schemas-microsoft-com:mac:vml" xmlns:p="http://schemas.openxmlformats.org/presentationml/2006/main" xmlns:c="http://schemas.openxmlformats.org/drawingml/2006/chart" xmlns:dgm="http://schemas.openxmlformats.org/drawingml/2006/diagram" xmlns:o="urn:schemas-microsoft-com:office:office" xmlns:v="urn:schemas-microsoft-com:vml" xmlns:pvml="urn:schemas-microsoft-com:office:powerpoint" xmlns:com="http://schemas.openxmlformats.org/drawingml/2006/compatibility" xmlns:p14="http://schemas.microsoft.com/office/powerpoint/2010/main">
   <p:cSld>
@@ -10274,15 +10891,15 @@
         </p:nvSpPr>
         <p:spPr>
           <a:xfrm>
-            <a:off x="311700" y="445025"/>
-            <a:ext cx="8520599" cy="572699"/>
+            <a:off x="671250" y="2141250"/>
+            <a:ext cx="7852199" cy="861000"/>
           </a:xfrm>
           <a:prstGeom prst="rect">
             <a:avLst/>
           </a:prstGeom>
         </p:spPr>
         <p:txBody>
-          <a:bodyPr anchorCtr="0" anchor="t" bIns="91425" lIns="91425" rIns="91425" tIns="91425">
+          <a:bodyPr anchorCtr="0" anchor="ctr" bIns="91425" lIns="91425" rIns="91425" tIns="91425">
             <a:noAutofit/>
           </a:bodyPr>
           <a:lstStyle/>
@@ -10295,110 +10912,8 @@
             </a:pPr>
             <a:r>
               <a:rPr lang="en"/>
-              <a:t>User Abilities </a:t>
-            </a:r>
-          </a:p>
-        </p:txBody>
-      </p:sp>
-      <p:sp>
-        <p:nvSpPr>
-          <p:cNvPr id="84" name="Shape 84"/>
-          <p:cNvSpPr txBox="1"/>
-          <p:nvPr>
-            <p:ph idx="1" type="body"/>
-          </p:nvPr>
-        </p:nvSpPr>
-        <p:spPr>
-          <a:xfrm>
-            <a:off x="311700" y="1152475"/>
-            <a:ext cx="8520599" cy="3416400"/>
-          </a:xfrm>
-          <a:prstGeom prst="rect">
-            <a:avLst/>
-          </a:prstGeom>
-        </p:spPr>
-        <p:txBody>
-          <a:bodyPr anchorCtr="0" anchor="t" bIns="91425" lIns="91425" rIns="91425" tIns="91425">
-            <a:noAutofit/>
-          </a:bodyPr>
-          <a:lstStyle/>
-          <a:p>
-            <a:pPr indent="-228600" lvl="0" marL="457200" rtl="0">
-              <a:spcBef>
-                <a:spcPts val="0"/>
-              </a:spcBef>
-            </a:pPr>
-            <a:r>
-              <a:rPr lang="en"/>
-              <a:t>Able to create an account and update their tax information</a:t>
-            </a:r>
-          </a:p>
-          <a:p>
-            <a:pPr indent="-228600" lvl="0" marL="457200" rtl="0">
-              <a:spcBef>
-                <a:spcPts val="0"/>
-              </a:spcBef>
-            </a:pPr>
-            <a:r>
-              <a:rPr lang="en"/>
-              <a:t>Have information stored with their account</a:t>
-            </a:r>
-          </a:p>
-          <a:p>
-            <a:pPr indent="-228600" lvl="0" marL="457200" rtl="0">
-              <a:spcBef>
-                <a:spcPts val="0"/>
-              </a:spcBef>
-            </a:pPr>
-            <a:r>
-              <a:rPr lang="en"/>
-              <a:t>Add payment methods and payment plans.</a:t>
-            </a:r>
-          </a:p>
-          <a:p>
-            <a:pPr indent="-228600" lvl="0" marL="457200" rtl="0">
-              <a:spcBef>
-                <a:spcPts val="0"/>
-              </a:spcBef>
-            </a:pPr>
-            <a:r>
-              <a:rPr lang="en"/>
-              <a:t>Make changes to their account.</a:t>
-            </a:r>
-          </a:p>
-          <a:p>
-            <a:pPr indent="-228600" lvl="0" marL="457200" rtl="0">
-              <a:spcBef>
-                <a:spcPts val="0"/>
-              </a:spcBef>
-            </a:pPr>
-            <a:r>
-              <a:rPr lang="en"/>
-              <a:t>Users are given the choice to decide what tax form to uses (federal or state).</a:t>
-            </a:r>
-          </a:p>
-          <a:p>
-            <a:pPr indent="-228600" lvl="0" marL="457200" rtl="0">
-              <a:spcBef>
-                <a:spcPts val="0"/>
-              </a:spcBef>
-            </a:pPr>
-            <a:r>
-              <a:rPr lang="en"/>
-              <a:t>View personal tax history, current tax bracket info, and payment balance information</a:t>
-            </a:r>
-          </a:p>
-          <a:p>
-            <a:pPr lvl="0" rtl="0">
-              <a:spcBef>
-                <a:spcPts val="0"/>
-              </a:spcBef>
-              <a:buNone/>
-            </a:pPr>
-            <a:r>
-              <a:t/>
-            </a:r>
-            <a:endParaRPr/>
+              <a:t>What it can do</a:t>
+            </a:r>
           </a:p>
         </p:txBody>
       </p:sp>
@@ -10418,7 +10933,7 @@
   <p:cSld>
     <p:spTree>
       <p:nvGrpSpPr>
-        <p:cNvPr id="88" name="Shape 88"/>
+        <p:cNvPr id="87" name="Shape 87"/>
         <p:cNvGrpSpPr/>
         <p:nvPr/>
       </p:nvGrpSpPr>
@@ -10432,7 +10947,7 @@
       </p:grpSpPr>
       <p:sp>
         <p:nvSpPr>
-          <p:cNvPr id="89" name="Shape 89"/>
+          <p:cNvPr id="88" name="Shape 88"/>
           <p:cNvSpPr txBox="1"/>
           <p:nvPr>
             <p:ph type="title"/>
@@ -10461,39 +10976,113 @@
             </a:pPr>
             <a:r>
               <a:rPr lang="en"/>
-              <a:t>User Creating a New Account </a:t>
+              <a:t>User Abilities </a:t>
             </a:r>
           </a:p>
         </p:txBody>
       </p:sp>
-      <p:pic>
-        <p:nvPicPr>
-          <p:cNvPr id="90" name="Shape 90"/>
-          <p:cNvPicPr preferRelativeResize="0"/>
-          <p:nvPr/>
-        </p:nvPicPr>
-        <p:blipFill>
-          <a:blip r:embed="rId3">
-            <a:alphaModFix/>
-          </a:blip>
-          <a:stretch>
-            <a:fillRect/>
-          </a:stretch>
-        </p:blipFill>
-        <p:spPr>
-          <a:xfrm>
-            <a:off x="1092225" y="1152475"/>
-            <a:ext cx="6244799" cy="3720100"/>
-          </a:xfrm>
-          <a:prstGeom prst="rect">
-            <a:avLst/>
-          </a:prstGeom>
-          <a:noFill/>
-          <a:ln>
-            <a:noFill/>
-          </a:ln>
-        </p:spPr>
-      </p:pic>
+      <p:sp>
+        <p:nvSpPr>
+          <p:cNvPr id="89" name="Shape 89"/>
+          <p:cNvSpPr txBox="1"/>
+          <p:nvPr>
+            <p:ph idx="1" type="body"/>
+          </p:nvPr>
+        </p:nvSpPr>
+        <p:spPr>
+          <a:xfrm>
+            <a:off x="311700" y="1152475"/>
+            <a:ext cx="8520599" cy="3416400"/>
+          </a:xfrm>
+          <a:prstGeom prst="rect">
+            <a:avLst/>
+          </a:prstGeom>
+        </p:spPr>
+        <p:txBody>
+          <a:bodyPr anchorCtr="0" anchor="t" bIns="91425" lIns="91425" rIns="91425" tIns="91425">
+            <a:noAutofit/>
+          </a:bodyPr>
+          <a:lstStyle/>
+          <a:p>
+            <a:pPr indent="-228600" lvl="0" marL="457200" rtl="0">
+              <a:spcBef>
+                <a:spcPts val="0"/>
+              </a:spcBef>
+            </a:pPr>
+            <a:r>
+              <a:rPr lang="en"/>
+              <a:t>Able to create an account and update their tax information</a:t>
+            </a:r>
+          </a:p>
+          <a:p>
+            <a:pPr indent="-228600" lvl="0" marL="457200" rtl="0">
+              <a:spcBef>
+                <a:spcPts val="0"/>
+              </a:spcBef>
+            </a:pPr>
+            <a:r>
+              <a:rPr lang="en"/>
+              <a:t>Have information stored with their account</a:t>
+            </a:r>
+          </a:p>
+          <a:p>
+            <a:pPr indent="-228600" lvl="0" marL="457200" rtl="0">
+              <a:spcBef>
+                <a:spcPts val="0"/>
+              </a:spcBef>
+            </a:pPr>
+            <a:r>
+              <a:rPr lang="en"/>
+              <a:t>Add payment methods and payment plans.</a:t>
+            </a:r>
+          </a:p>
+          <a:p>
+            <a:pPr indent="-228600" lvl="0" marL="457200" rtl="0">
+              <a:spcBef>
+                <a:spcPts val="0"/>
+              </a:spcBef>
+            </a:pPr>
+            <a:r>
+              <a:rPr lang="en"/>
+              <a:t>Make changes to their account.</a:t>
+            </a:r>
+          </a:p>
+          <a:p>
+            <a:pPr indent="-228600" lvl="0" marL="457200" rtl="0">
+              <a:spcBef>
+                <a:spcPts val="0"/>
+              </a:spcBef>
+            </a:pPr>
+            <a:r>
+              <a:rPr lang="en"/>
+              <a:t>Users are given the choice to decide what tax form to uses (federal or state).</a:t>
+            </a:r>
+          </a:p>
+          <a:p>
+            <a:pPr indent="-228600" lvl="0" marL="457200" rtl="0">
+              <a:spcBef>
+                <a:spcPts val="0"/>
+              </a:spcBef>
+            </a:pPr>
+            <a:r>
+              <a:rPr lang="en"/>
+              <a:t>View personal tax history, current tax bracket info, and payment balance information</a:t>
+            </a:r>
+          </a:p>
+          <a:p>
+            <a:pPr lvl="0" rtl="0">
+              <a:spcBef>
+                <a:spcPts val="0"/>
+              </a:spcBef>
+              <a:buNone/>
+            </a:pPr>
+            <a:r>
+              <a:t/>
+            </a:r>
+            <a:endParaRPr/>
+          </a:p>
+        </p:txBody>
+      </p:sp>
     </p:spTree>
   </p:cSld>
   <p:clrMapOvr>
@@ -10510,7 +11099,7 @@
   <p:cSld>
     <p:spTree>
       <p:nvGrpSpPr>
-        <p:cNvPr id="94" name="Shape 94"/>
+        <p:cNvPr id="93" name="Shape 93"/>
         <p:cNvGrpSpPr/>
         <p:nvPr/>
       </p:nvGrpSpPr>
@@ -10524,7 +11113,7 @@
       </p:grpSpPr>
       <p:sp>
         <p:nvSpPr>
-          <p:cNvPr id="95" name="Shape 95"/>
+          <p:cNvPr id="94" name="Shape 94"/>
           <p:cNvSpPr txBox="1"/>
           <p:nvPr>
             <p:ph type="title"/>
@@ -10553,14 +11142,14 @@
             </a:pPr>
             <a:r>
               <a:rPr lang="en"/>
-              <a:t>User completing a from </a:t>
+              <a:t>User Creating a New Account </a:t>
             </a:r>
           </a:p>
         </p:txBody>
       </p:sp>
       <p:pic>
         <p:nvPicPr>
-          <p:cNvPr id="96" name="Shape 96"/>
+          <p:cNvPr id="95" name="Shape 95"/>
           <p:cNvPicPr preferRelativeResize="0"/>
           <p:nvPr/>
         </p:nvPicPr>
@@ -10574,8 +11163,8 @@
         </p:blipFill>
         <p:spPr>
           <a:xfrm>
-            <a:off x="789450" y="1062800"/>
-            <a:ext cx="7565099" cy="3595750"/>
+            <a:off x="1092225" y="1152475"/>
+            <a:ext cx="6244799" cy="3720100"/>
           </a:xfrm>
           <a:prstGeom prst="rect">
             <a:avLst/>
@@ -10602,7 +11191,7 @@
   <p:cSld>
     <p:spTree>
       <p:nvGrpSpPr>
-        <p:cNvPr id="100" name="Shape 100"/>
+        <p:cNvPr id="99" name="Shape 99"/>
         <p:cNvGrpSpPr/>
         <p:nvPr/>
       </p:nvGrpSpPr>
@@ -10616,7 +11205,7 @@
       </p:grpSpPr>
       <p:sp>
         <p:nvSpPr>
-          <p:cNvPr id="101" name="Shape 101"/>
+          <p:cNvPr id="100" name="Shape 100"/>
           <p:cNvSpPr txBox="1"/>
           <p:nvPr>
             <p:ph type="title"/>
@@ -10645,14 +11234,14 @@
             </a:pPr>
             <a:r>
               <a:rPr lang="en"/>
-              <a:t>How Transactions Occur </a:t>
+              <a:t>User completing a from </a:t>
             </a:r>
           </a:p>
         </p:txBody>
       </p:sp>
       <p:pic>
         <p:nvPicPr>
-          <p:cNvPr id="102" name="Shape 102"/>
+          <p:cNvPr id="101" name="Shape 101"/>
           <p:cNvPicPr preferRelativeResize="0"/>
           <p:nvPr/>
         </p:nvPicPr>
@@ -10666,8 +11255,8 @@
         </p:blipFill>
         <p:spPr>
           <a:xfrm>
-            <a:off x="649125" y="1152475"/>
-            <a:ext cx="7676250" cy="3590974"/>
+            <a:off x="789450" y="1062800"/>
+            <a:ext cx="7565099" cy="3595750"/>
           </a:xfrm>
           <a:prstGeom prst="rect">
             <a:avLst/>
@@ -10694,7 +11283,7 @@
   <p:cSld>
     <p:spTree>
       <p:nvGrpSpPr>
-        <p:cNvPr id="106" name="Shape 106"/>
+        <p:cNvPr id="105" name="Shape 105"/>
         <p:cNvGrpSpPr/>
         <p:nvPr/>
       </p:nvGrpSpPr>
@@ -10708,7 +11297,7 @@
       </p:grpSpPr>
       <p:sp>
         <p:nvSpPr>
-          <p:cNvPr id="107" name="Shape 107"/>
+          <p:cNvPr id="106" name="Shape 106"/>
           <p:cNvSpPr txBox="1"/>
           <p:nvPr>
             <p:ph type="title"/>
@@ -10737,91 +11326,39 @@
             </a:pPr>
             <a:r>
               <a:rPr lang="en"/>
-              <a:t>Admins Abilities </a:t>
+              <a:t>How Transactions Occur </a:t>
             </a:r>
           </a:p>
         </p:txBody>
       </p:sp>
-      <p:sp>
-        <p:nvSpPr>
-          <p:cNvPr id="108" name="Shape 108"/>
-          <p:cNvSpPr txBox="1"/>
-          <p:nvPr>
-            <p:ph idx="1" type="body"/>
-          </p:nvPr>
-        </p:nvSpPr>
-        <p:spPr>
-          <a:xfrm>
-            <a:off x="311700" y="1152475"/>
-            <a:ext cx="8520599" cy="3416400"/>
-          </a:xfrm>
-          <a:prstGeom prst="rect">
-            <a:avLst/>
-          </a:prstGeom>
-        </p:spPr>
-        <p:txBody>
-          <a:bodyPr anchorCtr="0" anchor="t" bIns="91425" lIns="91425" rIns="91425" tIns="91425">
-            <a:noAutofit/>
-          </a:bodyPr>
-          <a:lstStyle/>
-          <a:p>
-            <a:pPr indent="-228600" lvl="0" marL="457200" rtl="0">
-              <a:spcBef>
-                <a:spcPts val="0"/>
-              </a:spcBef>
-            </a:pPr>
-            <a:r>
-              <a:rPr lang="en"/>
-              <a:t>Admins can make modifications to the tax bracket.</a:t>
-            </a:r>
-          </a:p>
-          <a:p>
-            <a:pPr indent="-228600" lvl="0" marL="457200" rtl="0">
-              <a:spcBef>
-                <a:spcPts val="0"/>
-              </a:spcBef>
-            </a:pPr>
-            <a:r>
-              <a:rPr lang="en"/>
-              <a:t>They have the ability to add, delete, and modify tax brackets.</a:t>
-            </a:r>
-          </a:p>
-          <a:p>
-            <a:pPr indent="-228600" lvl="0" marL="457200" rtl="0">
-              <a:spcBef>
-                <a:spcPts val="0"/>
-              </a:spcBef>
-            </a:pPr>
-            <a:r>
-              <a:rPr lang="en"/>
-              <a:t>They can also pull and print data from taxpayer information. </a:t>
-            </a:r>
-          </a:p>
-          <a:p>
-            <a:pPr indent="-228600" lvl="0" marL="457200" rtl="0">
-              <a:spcBef>
-                <a:spcPts val="0"/>
-              </a:spcBef>
-            </a:pPr>
-            <a:r>
-              <a:rPr lang="en"/>
-              <a:t>Add other admins.</a:t>
-            </a:r>
-          </a:p>
-          <a:p>
-            <a:pPr lvl="0" rtl="0">
-              <a:spcBef>
-                <a:spcPts val="0"/>
-              </a:spcBef>
-              <a:buNone/>
-            </a:pPr>
-            <a:r>
-              <a:t/>
-            </a:r>
-            <a:endParaRPr/>
-          </a:p>
-        </p:txBody>
-      </p:sp>
+      <p:pic>
+        <p:nvPicPr>
+          <p:cNvPr id="107" name="Shape 107"/>
+          <p:cNvPicPr preferRelativeResize="0"/>
+          <p:nvPr/>
+        </p:nvPicPr>
+        <p:blipFill>
+          <a:blip r:embed="rId3">
+            <a:alphaModFix/>
+          </a:blip>
+          <a:stretch>
+            <a:fillRect/>
+          </a:stretch>
+        </p:blipFill>
+        <p:spPr>
+          <a:xfrm>
+            <a:off x="649125" y="1152475"/>
+            <a:ext cx="7676250" cy="3590974"/>
+          </a:xfrm>
+          <a:prstGeom prst="rect">
+            <a:avLst/>
+          </a:prstGeom>
+          <a:noFill/>
+          <a:ln>
+            <a:noFill/>
+          </a:ln>
+        </p:spPr>
+      </p:pic>
     </p:spTree>
   </p:cSld>
   <p:clrMapOvr>

</xml_diff>